<commit_message>
Changes to compilers slides
</commit_message>
<xml_diff>
--- a/courses/compilers/lectures/G-IRs.pptx
+++ b/courses/compilers/lectures/G-IRs.pptx
@@ -5,10 +5,10 @@
     <p:sldMasterId id="2147483842" r:id="rId1"/>
   </p:sldMasterIdLst>
   <p:notesMasterIdLst>
-    <p:notesMasterId r:id="rId36"/>
+    <p:notesMasterId r:id="rId37"/>
   </p:notesMasterIdLst>
   <p:handoutMasterIdLst>
-    <p:handoutMasterId r:id="rId37"/>
+    <p:handoutMasterId r:id="rId38"/>
   </p:handoutMasterIdLst>
   <p:sldIdLst>
     <p:sldId id="256" r:id="rId2"/>
@@ -45,11 +45,12 @@
     <p:sldId id="291" r:id="rId33"/>
     <p:sldId id="272" r:id="rId34"/>
     <p:sldId id="273" r:id="rId35"/>
+    <p:sldId id="304" r:id="rId36"/>
   </p:sldIdLst>
   <p:sldSz cx="9144000" cy="6858000" type="screen4x3"/>
   <p:notesSz cx="7315200" cy="9601200"/>
   <p:custDataLst>
-    <p:tags r:id="rId38"/>
+    <p:tags r:id="rId39"/>
   </p:custDataLst>
   <p:defaultTextStyle>
     <a:defPPr>
@@ -511,7 +512,7 @@
           </a:ln>
           <a:extLst>
             <a:ext uri="{909E8E84-426E-40dd-AFC4-6F175D3DCCD1}">
-              <a14:hiddenFill xmlns:a14="http://schemas.microsoft.com/office/drawing/2010/main" xmlns="">
+              <a14:hiddenFill xmlns="" xmlns:a14="http://schemas.microsoft.com/office/drawing/2010/main">
                 <a:solidFill>
                   <a:srgbClr val="FFFFFF"/>
                 </a:solidFill>
@@ -970,14 +971,14 @@
           <a:ln/>
           <a:extLst>
             <a:ext uri="{909E8E84-426E-40dd-AFC4-6F175D3DCCD1}">
-              <a14:hiddenFill xmlns:a14="http://schemas.microsoft.com/office/drawing/2010/main" xmlns="">
+              <a14:hiddenFill xmlns="" xmlns:a14="http://schemas.microsoft.com/office/drawing/2010/main">
                 <a:solidFill>
                   <a:srgbClr val="FFFFFF"/>
                 </a:solidFill>
               </a14:hiddenFill>
             </a:ext>
             <a:ext uri="{91240B29-F687-4f45-9708-019B960494DF}">
-              <a14:hiddenLine xmlns:a14="http://schemas.microsoft.com/office/drawing/2010/main" xmlns="" w="9525">
+              <a14:hiddenLine xmlns="" xmlns:a14="http://schemas.microsoft.com/office/drawing/2010/main" w="9525">
                 <a:solidFill>
                   <a:srgbClr val="000000"/>
                 </a:solidFill>
@@ -1131,14 +1132,14 @@
           <a:ln/>
           <a:extLst>
             <a:ext uri="{909E8E84-426E-40dd-AFC4-6F175D3DCCD1}">
-              <a14:hiddenFill xmlns:a14="http://schemas.microsoft.com/office/drawing/2010/main" xmlns="">
+              <a14:hiddenFill xmlns="" xmlns:a14="http://schemas.microsoft.com/office/drawing/2010/main">
                 <a:solidFill>
                   <a:srgbClr val="FFFFFF"/>
                 </a:solidFill>
               </a14:hiddenFill>
             </a:ext>
             <a:ext uri="{91240B29-F687-4f45-9708-019B960494DF}">
-              <a14:hiddenLine xmlns:a14="http://schemas.microsoft.com/office/drawing/2010/main" xmlns="" w="9525">
+              <a14:hiddenLine xmlns="" xmlns:a14="http://schemas.microsoft.com/office/drawing/2010/main" w="9525">
                 <a:solidFill>
                   <a:srgbClr val="000000"/>
                 </a:solidFill>
@@ -1198,14 +1199,14 @@
           <a:ln/>
           <a:extLst>
             <a:ext uri="{909E8E84-426E-40dd-AFC4-6F175D3DCCD1}">
-              <a14:hiddenFill xmlns:a14="http://schemas.microsoft.com/office/drawing/2010/main" xmlns="">
+              <a14:hiddenFill xmlns="" xmlns:a14="http://schemas.microsoft.com/office/drawing/2010/main">
                 <a:solidFill>
                   <a:srgbClr val="FFFFFF"/>
                 </a:solidFill>
               </a14:hiddenFill>
             </a:ext>
             <a:ext uri="{91240B29-F687-4f45-9708-019B960494DF}">
-              <a14:hiddenLine xmlns:a14="http://schemas.microsoft.com/office/drawing/2010/main" xmlns="" w="9525">
+              <a14:hiddenLine xmlns="" xmlns:a14="http://schemas.microsoft.com/office/drawing/2010/main" w="9525">
                 <a:solidFill>
                   <a:srgbClr val="000000"/>
                 </a:solidFill>
@@ -1359,14 +1360,14 @@
           <a:ln/>
           <a:extLst>
             <a:ext uri="{909E8E84-426E-40dd-AFC4-6F175D3DCCD1}">
-              <a14:hiddenFill xmlns:a14="http://schemas.microsoft.com/office/drawing/2010/main" xmlns="">
+              <a14:hiddenFill xmlns="" xmlns:a14="http://schemas.microsoft.com/office/drawing/2010/main">
                 <a:solidFill>
                   <a:srgbClr val="FFFFFF"/>
                 </a:solidFill>
               </a14:hiddenFill>
             </a:ext>
             <a:ext uri="{91240B29-F687-4f45-9708-019B960494DF}">
-              <a14:hiddenLine xmlns:a14="http://schemas.microsoft.com/office/drawing/2010/main" xmlns="" w="9525">
+              <a14:hiddenLine xmlns="" xmlns:a14="http://schemas.microsoft.com/office/drawing/2010/main" w="9525">
                 <a:solidFill>
                   <a:srgbClr val="000000"/>
                 </a:solidFill>
@@ -1429,14 +1430,14 @@
           <a:ln/>
           <a:extLst>
             <a:ext uri="{909E8E84-426E-40dd-AFC4-6F175D3DCCD1}">
-              <a14:hiddenFill xmlns:a14="http://schemas.microsoft.com/office/drawing/2010/main" xmlns="">
+              <a14:hiddenFill xmlns="" xmlns:a14="http://schemas.microsoft.com/office/drawing/2010/main">
                 <a:solidFill>
                   <a:srgbClr val="FFFFFF"/>
                 </a:solidFill>
               </a14:hiddenFill>
             </a:ext>
             <a:ext uri="{91240B29-F687-4f45-9708-019B960494DF}">
-              <a14:hiddenLine xmlns:a14="http://schemas.microsoft.com/office/drawing/2010/main" xmlns="" w="9525">
+              <a14:hiddenLine xmlns="" xmlns:a14="http://schemas.microsoft.com/office/drawing/2010/main" w="9525">
                 <a:solidFill>
                   <a:srgbClr val="000000"/>
                 </a:solidFill>
@@ -1590,14 +1591,14 @@
           <a:ln/>
           <a:extLst>
             <a:ext uri="{909E8E84-426E-40dd-AFC4-6F175D3DCCD1}">
-              <a14:hiddenFill xmlns:a14="http://schemas.microsoft.com/office/drawing/2010/main" xmlns="">
+              <a14:hiddenFill xmlns="" xmlns:a14="http://schemas.microsoft.com/office/drawing/2010/main">
                 <a:solidFill>
                   <a:srgbClr val="FFFFFF"/>
                 </a:solidFill>
               </a14:hiddenFill>
             </a:ext>
             <a:ext uri="{91240B29-F687-4f45-9708-019B960494DF}">
-              <a14:hiddenLine xmlns:a14="http://schemas.microsoft.com/office/drawing/2010/main" xmlns="" w="9525">
+              <a14:hiddenLine xmlns="" xmlns:a14="http://schemas.microsoft.com/office/drawing/2010/main" w="9525">
                 <a:solidFill>
                   <a:srgbClr val="000000"/>
                 </a:solidFill>
@@ -1660,14 +1661,14 @@
           <a:ln/>
           <a:extLst>
             <a:ext uri="{909E8E84-426E-40dd-AFC4-6F175D3DCCD1}">
-              <a14:hiddenFill xmlns:a14="http://schemas.microsoft.com/office/drawing/2010/main" xmlns="">
+              <a14:hiddenFill xmlns="" xmlns:a14="http://schemas.microsoft.com/office/drawing/2010/main">
                 <a:solidFill>
                   <a:srgbClr val="FFFFFF"/>
                 </a:solidFill>
               </a14:hiddenFill>
             </a:ext>
             <a:ext uri="{91240B29-F687-4f45-9708-019B960494DF}">
-              <a14:hiddenLine xmlns:a14="http://schemas.microsoft.com/office/drawing/2010/main" xmlns="" w="9525">
+              <a14:hiddenLine xmlns="" xmlns:a14="http://schemas.microsoft.com/office/drawing/2010/main" w="9525">
                 <a:solidFill>
                   <a:srgbClr val="000000"/>
                 </a:solidFill>
@@ -1821,14 +1822,14 @@
           <a:ln/>
           <a:extLst>
             <a:ext uri="{909E8E84-426E-40dd-AFC4-6F175D3DCCD1}">
-              <a14:hiddenFill xmlns:a14="http://schemas.microsoft.com/office/drawing/2010/main" xmlns="">
+              <a14:hiddenFill xmlns="" xmlns:a14="http://schemas.microsoft.com/office/drawing/2010/main">
                 <a:solidFill>
                   <a:srgbClr val="FFFFFF"/>
                 </a:solidFill>
               </a14:hiddenFill>
             </a:ext>
             <a:ext uri="{91240B29-F687-4f45-9708-019B960494DF}">
-              <a14:hiddenLine xmlns:a14="http://schemas.microsoft.com/office/drawing/2010/main" xmlns="" w="9525">
+              <a14:hiddenLine xmlns="" xmlns:a14="http://schemas.microsoft.com/office/drawing/2010/main" w="9525">
                 <a:solidFill>
                   <a:srgbClr val="000000"/>
                 </a:solidFill>
@@ -1891,14 +1892,14 @@
           <a:ln/>
           <a:extLst>
             <a:ext uri="{909E8E84-426E-40dd-AFC4-6F175D3DCCD1}">
-              <a14:hiddenFill xmlns:a14="http://schemas.microsoft.com/office/drawing/2010/main" xmlns="">
+              <a14:hiddenFill xmlns="" xmlns:a14="http://schemas.microsoft.com/office/drawing/2010/main">
                 <a:solidFill>
                   <a:srgbClr val="FFFFFF"/>
                 </a:solidFill>
               </a14:hiddenFill>
             </a:ext>
             <a:ext uri="{91240B29-F687-4f45-9708-019B960494DF}">
-              <a14:hiddenLine xmlns:a14="http://schemas.microsoft.com/office/drawing/2010/main" xmlns="" w="9525">
+              <a14:hiddenLine xmlns="" xmlns:a14="http://schemas.microsoft.com/office/drawing/2010/main" w="9525">
                 <a:solidFill>
                   <a:srgbClr val="000000"/>
                 </a:solidFill>
@@ -2052,14 +2053,14 @@
           <a:ln/>
           <a:extLst>
             <a:ext uri="{909E8E84-426E-40dd-AFC4-6F175D3DCCD1}">
-              <a14:hiddenFill xmlns:a14="http://schemas.microsoft.com/office/drawing/2010/main" xmlns="">
+              <a14:hiddenFill xmlns="" xmlns:a14="http://schemas.microsoft.com/office/drawing/2010/main">
                 <a:solidFill>
                   <a:srgbClr val="FFFFFF"/>
                 </a:solidFill>
               </a14:hiddenFill>
             </a:ext>
             <a:ext uri="{91240B29-F687-4f45-9708-019B960494DF}">
-              <a14:hiddenLine xmlns:a14="http://schemas.microsoft.com/office/drawing/2010/main" xmlns="" w="9525">
+              <a14:hiddenLine xmlns="" xmlns:a14="http://schemas.microsoft.com/office/drawing/2010/main" w="9525">
                 <a:solidFill>
                   <a:srgbClr val="000000"/>
                 </a:solidFill>
@@ -2136,14 +2137,14 @@
           <a:ln/>
           <a:extLst>
             <a:ext uri="{909E8E84-426E-40dd-AFC4-6F175D3DCCD1}">
-              <a14:hiddenFill xmlns:a14="http://schemas.microsoft.com/office/drawing/2010/main" xmlns="">
+              <a14:hiddenFill xmlns="" xmlns:a14="http://schemas.microsoft.com/office/drawing/2010/main">
                 <a:solidFill>
                   <a:srgbClr val="FFFFFF"/>
                 </a:solidFill>
               </a14:hiddenFill>
             </a:ext>
             <a:ext uri="{91240B29-F687-4f45-9708-019B960494DF}">
-              <a14:hiddenLine xmlns:a14="http://schemas.microsoft.com/office/drawing/2010/main" xmlns="" w="9525">
+              <a14:hiddenLine xmlns="" xmlns:a14="http://schemas.microsoft.com/office/drawing/2010/main" w="9525">
                 <a:solidFill>
                   <a:srgbClr val="000000"/>
                 </a:solidFill>
@@ -2180,14 +2181,14 @@
           <a:ln/>
           <a:extLst>
             <a:ext uri="{909E8E84-426E-40dd-AFC4-6F175D3DCCD1}">
-              <a14:hiddenFill xmlns:a14="http://schemas.microsoft.com/office/drawing/2010/main" xmlns="">
+              <a14:hiddenFill xmlns="" xmlns:a14="http://schemas.microsoft.com/office/drawing/2010/main">
                 <a:solidFill>
                   <a:srgbClr val="FFFFFF"/>
                 </a:solidFill>
               </a14:hiddenFill>
             </a:ext>
             <a:ext uri="{91240B29-F687-4f45-9708-019B960494DF}">
-              <a14:hiddenLine xmlns:a14="http://schemas.microsoft.com/office/drawing/2010/main" xmlns="" w="9525">
+              <a14:hiddenLine xmlns="" xmlns:a14="http://schemas.microsoft.com/office/drawing/2010/main" w="9525">
                 <a:solidFill>
                   <a:srgbClr val="000000"/>
                 </a:solidFill>
@@ -2366,14 +2367,14 @@
           <a:ln/>
           <a:extLst>
             <a:ext uri="{909E8E84-426E-40dd-AFC4-6F175D3DCCD1}">
-              <a14:hiddenFill xmlns:a14="http://schemas.microsoft.com/office/drawing/2010/main" xmlns="">
+              <a14:hiddenFill xmlns="" xmlns:a14="http://schemas.microsoft.com/office/drawing/2010/main">
                 <a:solidFill>
                   <a:srgbClr val="FFFFFF"/>
                 </a:solidFill>
               </a14:hiddenFill>
             </a:ext>
             <a:ext uri="{91240B29-F687-4f45-9708-019B960494DF}">
-              <a14:hiddenLine xmlns:a14="http://schemas.microsoft.com/office/drawing/2010/main" xmlns="" w="9525">
+              <a14:hiddenLine xmlns="" xmlns:a14="http://schemas.microsoft.com/office/drawing/2010/main" w="9525">
                 <a:solidFill>
                   <a:srgbClr val="000000"/>
                 </a:solidFill>
@@ -2410,14 +2411,14 @@
           <a:ln/>
           <a:extLst>
             <a:ext uri="{909E8E84-426E-40dd-AFC4-6F175D3DCCD1}">
-              <a14:hiddenFill xmlns:a14="http://schemas.microsoft.com/office/drawing/2010/main" xmlns="">
+              <a14:hiddenFill xmlns="" xmlns:a14="http://schemas.microsoft.com/office/drawing/2010/main">
                 <a:solidFill>
                   <a:srgbClr val="FFFFFF"/>
                 </a:solidFill>
               </a14:hiddenFill>
             </a:ext>
             <a:ext uri="{91240B29-F687-4f45-9708-019B960494DF}">
-              <a14:hiddenLine xmlns:a14="http://schemas.microsoft.com/office/drawing/2010/main" xmlns="" w="9525">
+              <a14:hiddenLine xmlns="" xmlns:a14="http://schemas.microsoft.com/office/drawing/2010/main" w="9525">
                 <a:solidFill>
                   <a:srgbClr val="000000"/>
                 </a:solidFill>
@@ -2734,7 +2735,7 @@
             </a:pPr>
             <a:fld id="{B3FA8948-1590-BB49-B7D9-66238BF606E0}" type="datetime1">
               <a:rPr lang="en-US" smtClean="0"/>
-              <a:t>4/29/19</a:t>
+              <a:t>5/1/19</a:t>
             </a:fld>
             <a:endParaRPr lang="en-US"/>
           </a:p>
@@ -2922,7 +2923,7 @@
             </a:pPr>
             <a:fld id="{58FB5CDC-760A-184B-8E51-CFA4FCC87B38}" type="datetime1">
               <a:rPr lang="en-US" smtClean="0"/>
-              <a:t>4/29/19</a:t>
+              <a:t>5/1/19</a:t>
             </a:fld>
             <a:endParaRPr lang="en-US"/>
           </a:p>
@@ -3120,7 +3121,7 @@
             </a:pPr>
             <a:fld id="{35012AD4-7939-DA40-8900-F0882DC8CBAB}" type="datetime1">
               <a:rPr lang="en-US" smtClean="0"/>
-              <a:t>4/29/19</a:t>
+              <a:t>5/1/19</a:t>
             </a:fld>
             <a:endParaRPr lang="en-US"/>
           </a:p>
@@ -3308,7 +3309,7 @@
             </a:pPr>
             <a:fld id="{3558B36C-5A57-9443-9516-9CE31913BEB8}" type="datetime1">
               <a:rPr lang="en-US" smtClean="0"/>
-              <a:t>4/29/19</a:t>
+              <a:t>5/1/19</a:t>
             </a:fld>
             <a:endParaRPr lang="en-US"/>
           </a:p>
@@ -3573,7 +3574,7 @@
             </a:pPr>
             <a:fld id="{A96F4DC7-B160-E34A-B289-BB6B562024F3}" type="datetime1">
               <a:rPr lang="en-US" smtClean="0"/>
-              <a:t>4/29/19</a:t>
+              <a:t>5/1/19</a:t>
             </a:fld>
             <a:endParaRPr lang="en-US"/>
           </a:p>
@@ -3878,7 +3879,7 @@
             </a:pPr>
             <a:fld id="{1742F5DA-6AE7-6144-9766-1748B11CBC82}" type="datetime1">
               <a:rPr lang="en-US" smtClean="0"/>
-              <a:t>4/29/19</a:t>
+              <a:t>5/1/19</a:t>
             </a:fld>
             <a:endParaRPr lang="en-US"/>
           </a:p>
@@ -4317,7 +4318,7 @@
             </a:pPr>
             <a:fld id="{F60F2F62-EBC1-B243-9D88-D29D0EF8BA45}" type="datetime1">
               <a:rPr lang="en-US" smtClean="0"/>
-              <a:t>4/29/19</a:t>
+              <a:t>5/1/19</a:t>
             </a:fld>
             <a:endParaRPr lang="en-US"/>
           </a:p>
@@ -4454,7 +4455,7 @@
             </a:pPr>
             <a:fld id="{57DBDA73-A667-274B-860C-F08D7CC174C6}" type="datetime1">
               <a:rPr lang="en-US" smtClean="0"/>
-              <a:t>4/29/19</a:t>
+              <a:t>5/1/19</a:t>
             </a:fld>
             <a:endParaRPr lang="en-US"/>
           </a:p>
@@ -4569,7 +4570,7 @@
             </a:pPr>
             <a:fld id="{75D6CC4C-2F2B-2148-A533-1775692CA239}" type="datetime1">
               <a:rPr lang="en-US" smtClean="0"/>
-              <a:t>4/29/19</a:t>
+              <a:t>5/1/19</a:t>
             </a:fld>
             <a:endParaRPr lang="en-US"/>
           </a:p>
@@ -4864,7 +4865,7 @@
             </a:pPr>
             <a:fld id="{DAE80E62-3042-1745-96CA-8A054A76CFD5}" type="datetime1">
               <a:rPr lang="en-US" smtClean="0"/>
-              <a:t>4/29/19</a:t>
+              <a:t>5/1/19</a:t>
             </a:fld>
             <a:endParaRPr lang="en-US"/>
           </a:p>
@@ -5136,7 +5137,7 @@
             </a:pPr>
             <a:fld id="{81601E5B-9FCD-7249-A230-BFAD391C4918}" type="datetime1">
               <a:rPr lang="en-US" smtClean="0"/>
-              <a:t>4/29/19</a:t>
+              <a:t>5/1/19</a:t>
             </a:fld>
             <a:endParaRPr lang="en-US"/>
           </a:p>
@@ -5368,7 +5369,7 @@
               <a:pPr>
                 <a:defRPr/>
               </a:pPr>
-              <a:t>4/29/19</a:t>
+              <a:t>5/1/19</a:t>
             </a:fld>
             <a:endParaRPr lang="en-US" dirty="0"/>
           </a:p>
@@ -5840,14 +5841,14 @@
           <a:ln/>
           <a:extLst>
             <a:ext uri="{909E8E84-426E-40dd-AFC4-6F175D3DCCD1}">
-              <a14:hiddenFill xmlns:a14="http://schemas.microsoft.com/office/drawing/2010/main" xmlns="">
+              <a14:hiddenFill xmlns="" xmlns:a14="http://schemas.microsoft.com/office/drawing/2010/main">
                 <a:solidFill>
                   <a:srgbClr val="FFFFFF"/>
                 </a:solidFill>
               </a14:hiddenFill>
             </a:ext>
             <a:ext uri="{91240B29-F687-4f45-9708-019B960494DF}">
-              <a14:hiddenLine xmlns:a14="http://schemas.microsoft.com/office/drawing/2010/main" xmlns="" w="9525">
+              <a14:hiddenLine xmlns="" xmlns:a14="http://schemas.microsoft.com/office/drawing/2010/main" w="9525">
                 <a:solidFill>
                   <a:srgbClr val="000000"/>
                 </a:solidFill>
@@ -5993,14 +5994,14 @@
           <a:ln/>
           <a:extLst>
             <a:ext uri="{909E8E84-426E-40dd-AFC4-6F175D3DCCD1}">
-              <a14:hiddenFill xmlns:a14="http://schemas.microsoft.com/office/drawing/2010/main" xmlns="">
+              <a14:hiddenFill xmlns="" xmlns:a14="http://schemas.microsoft.com/office/drawing/2010/main">
                 <a:solidFill>
                   <a:srgbClr val="FFFFFF"/>
                 </a:solidFill>
               </a14:hiddenFill>
             </a:ext>
             <a:ext uri="{91240B29-F687-4f45-9708-019B960494DF}">
-              <a14:hiddenLine xmlns:a14="http://schemas.microsoft.com/office/drawing/2010/main" xmlns="" w="9525">
+              <a14:hiddenLine xmlns="" xmlns:a14="http://schemas.microsoft.com/office/drawing/2010/main" w="9525">
                 <a:solidFill>
                   <a:srgbClr val="000000"/>
                 </a:solidFill>
@@ -10059,14 +10060,14 @@
           <a:ln/>
           <a:extLst>
             <a:ext uri="{909E8E84-426E-40dd-AFC4-6F175D3DCCD1}">
-              <a14:hiddenFill xmlns:a14="http://schemas.microsoft.com/office/drawing/2010/main" xmlns="">
+              <a14:hiddenFill xmlns="" xmlns:a14="http://schemas.microsoft.com/office/drawing/2010/main">
                 <a:solidFill>
                   <a:srgbClr val="FFFFFF"/>
                 </a:solidFill>
               </a14:hiddenFill>
             </a:ext>
             <a:ext uri="{91240B29-F687-4f45-9708-019B960494DF}">
-              <a14:hiddenLine xmlns:a14="http://schemas.microsoft.com/office/drawing/2010/main" xmlns="" w="9525">
+              <a14:hiddenLine xmlns="" xmlns:a14="http://schemas.microsoft.com/office/drawing/2010/main" w="9525">
                 <a:solidFill>
                   <a:srgbClr val="000000"/>
                 </a:solidFill>
@@ -10201,14 +10202,14 @@
           <a:ln/>
           <a:extLst>
             <a:ext uri="{909E8E84-426E-40dd-AFC4-6F175D3DCCD1}">
-              <a14:hiddenFill xmlns:a14="http://schemas.microsoft.com/office/drawing/2010/main" xmlns="">
+              <a14:hiddenFill xmlns="" xmlns:a14="http://schemas.microsoft.com/office/drawing/2010/main">
                 <a:solidFill>
                   <a:srgbClr val="FFFFFF"/>
                 </a:solidFill>
               </a14:hiddenFill>
             </a:ext>
             <a:ext uri="{91240B29-F687-4f45-9708-019B960494DF}">
-              <a14:hiddenLine xmlns:a14="http://schemas.microsoft.com/office/drawing/2010/main" xmlns="" w="9525">
+              <a14:hiddenLine xmlns="" xmlns:a14="http://schemas.microsoft.com/office/drawing/2010/main" w="9525">
                 <a:solidFill>
                   <a:srgbClr val="000000"/>
                 </a:solidFill>
@@ -11099,14 +11100,14 @@
           <a:ln/>
           <a:extLst>
             <a:ext uri="{909E8E84-426E-40dd-AFC4-6F175D3DCCD1}">
-              <a14:hiddenFill xmlns:a14="http://schemas.microsoft.com/office/drawing/2010/main" xmlns="">
+              <a14:hiddenFill xmlns="" xmlns:a14="http://schemas.microsoft.com/office/drawing/2010/main">
                 <a:solidFill>
                   <a:srgbClr val="FFFFFF"/>
                 </a:solidFill>
               </a14:hiddenFill>
             </a:ext>
             <a:ext uri="{91240B29-F687-4f45-9708-019B960494DF}">
-              <a14:hiddenLine xmlns:a14="http://schemas.microsoft.com/office/drawing/2010/main" xmlns="" w="9525">
+              <a14:hiddenLine xmlns="" xmlns:a14="http://schemas.microsoft.com/office/drawing/2010/main" w="9525">
                 <a:solidFill>
                   <a:srgbClr val="000000"/>
                 </a:solidFill>
@@ -11244,14 +11245,14 @@
           <a:ln/>
           <a:extLst>
             <a:ext uri="{909E8E84-426E-40dd-AFC4-6F175D3DCCD1}">
-              <a14:hiddenFill xmlns:a14="http://schemas.microsoft.com/office/drawing/2010/main" xmlns="">
+              <a14:hiddenFill xmlns="" xmlns:a14="http://schemas.microsoft.com/office/drawing/2010/main">
                 <a:solidFill>
                   <a:srgbClr val="FFFFFF"/>
                 </a:solidFill>
               </a14:hiddenFill>
             </a:ext>
             <a:ext uri="{91240B29-F687-4f45-9708-019B960494DF}">
-              <a14:hiddenLine xmlns:a14="http://schemas.microsoft.com/office/drawing/2010/main" xmlns="" w="9525">
+              <a14:hiddenLine xmlns="" xmlns:a14="http://schemas.microsoft.com/office/drawing/2010/main" w="9525">
                 <a:solidFill>
                   <a:srgbClr val="000000"/>
                 </a:solidFill>
@@ -11773,14 +11774,14 @@
           <a:ln/>
           <a:extLst>
             <a:ext uri="{909E8E84-426E-40dd-AFC4-6F175D3DCCD1}">
-              <a14:hiddenFill xmlns:a14="http://schemas.microsoft.com/office/drawing/2010/main" xmlns="">
+              <a14:hiddenFill xmlns="" xmlns:a14="http://schemas.microsoft.com/office/drawing/2010/main">
                 <a:solidFill>
                   <a:srgbClr val="FFFFFF"/>
                 </a:solidFill>
               </a14:hiddenFill>
             </a:ext>
             <a:ext uri="{91240B29-F687-4f45-9708-019B960494DF}">
-              <a14:hiddenLine xmlns:a14="http://schemas.microsoft.com/office/drawing/2010/main" xmlns="" w="9525">
+              <a14:hiddenLine xmlns="" xmlns:a14="http://schemas.microsoft.com/office/drawing/2010/main" w="9525">
                 <a:solidFill>
                   <a:srgbClr val="000000"/>
                 </a:solidFill>
@@ -11918,14 +11919,14 @@
           <a:ln/>
           <a:extLst>
             <a:ext uri="{909E8E84-426E-40dd-AFC4-6F175D3DCCD1}">
-              <a14:hiddenFill xmlns:a14="http://schemas.microsoft.com/office/drawing/2010/main" xmlns="">
+              <a14:hiddenFill xmlns="" xmlns:a14="http://schemas.microsoft.com/office/drawing/2010/main">
                 <a:solidFill>
                   <a:srgbClr val="FFFFFF"/>
                 </a:solidFill>
               </a14:hiddenFill>
             </a:ext>
             <a:ext uri="{91240B29-F687-4f45-9708-019B960494DF}">
-              <a14:hiddenLine xmlns:a14="http://schemas.microsoft.com/office/drawing/2010/main" xmlns="" w="9525">
+              <a14:hiddenLine xmlns="" xmlns:a14="http://schemas.microsoft.com/office/drawing/2010/main" w="9525">
                 <a:solidFill>
                   <a:srgbClr val="000000"/>
                 </a:solidFill>
@@ -12244,14 +12245,14 @@
           <a:ln/>
           <a:extLst>
             <a:ext uri="{909E8E84-426E-40dd-AFC4-6F175D3DCCD1}">
-              <a14:hiddenFill xmlns:a14="http://schemas.microsoft.com/office/drawing/2010/main" xmlns="">
+              <a14:hiddenFill xmlns="" xmlns:a14="http://schemas.microsoft.com/office/drawing/2010/main">
                 <a:solidFill>
                   <a:srgbClr val="FFFFFF"/>
                 </a:solidFill>
               </a14:hiddenFill>
             </a:ext>
             <a:ext uri="{91240B29-F687-4f45-9708-019B960494DF}">
-              <a14:hiddenLine xmlns:a14="http://schemas.microsoft.com/office/drawing/2010/main" xmlns="" w="9525">
+              <a14:hiddenLine xmlns="" xmlns:a14="http://schemas.microsoft.com/office/drawing/2010/main" w="9525">
                 <a:solidFill>
                   <a:srgbClr val="000000"/>
                 </a:solidFill>
@@ -12389,14 +12390,14 @@
           <a:ln/>
           <a:extLst>
             <a:ext uri="{909E8E84-426E-40dd-AFC4-6F175D3DCCD1}">
-              <a14:hiddenFill xmlns:a14="http://schemas.microsoft.com/office/drawing/2010/main" xmlns="">
+              <a14:hiddenFill xmlns="" xmlns:a14="http://schemas.microsoft.com/office/drawing/2010/main">
                 <a:solidFill>
                   <a:srgbClr val="FFFFFF"/>
                 </a:solidFill>
               </a14:hiddenFill>
             </a:ext>
             <a:ext uri="{91240B29-F687-4f45-9708-019B960494DF}">
-              <a14:hiddenLine xmlns:a14="http://schemas.microsoft.com/office/drawing/2010/main" xmlns="" w="9525">
+              <a14:hiddenLine xmlns="" xmlns:a14="http://schemas.microsoft.com/office/drawing/2010/main" w="9525">
                 <a:solidFill>
                   <a:srgbClr val="000000"/>
                 </a:solidFill>
@@ -17331,14 +17332,14 @@
           <a:ln/>
           <a:extLst>
             <a:ext uri="{909E8E84-426E-40dd-AFC4-6F175D3DCCD1}">
-              <a14:hiddenFill xmlns:a14="http://schemas.microsoft.com/office/drawing/2010/main" xmlns="">
+              <a14:hiddenFill xmlns="" xmlns:a14="http://schemas.microsoft.com/office/drawing/2010/main">
                 <a:solidFill>
                   <a:srgbClr val="FFFFFF"/>
                 </a:solidFill>
               </a14:hiddenFill>
             </a:ext>
             <a:ext uri="{91240B29-F687-4f45-9708-019B960494DF}">
-              <a14:hiddenLine xmlns:a14="http://schemas.microsoft.com/office/drawing/2010/main" xmlns="" w="9525">
+              <a14:hiddenLine xmlns="" xmlns:a14="http://schemas.microsoft.com/office/drawing/2010/main" w="9525">
                 <a:solidFill>
                   <a:srgbClr val="000000"/>
                 </a:solidFill>
@@ -17476,14 +17477,14 @@
           <a:ln/>
           <a:extLst>
             <a:ext uri="{909E8E84-426E-40dd-AFC4-6F175D3DCCD1}">
-              <a14:hiddenFill xmlns:a14="http://schemas.microsoft.com/office/drawing/2010/main" xmlns="">
+              <a14:hiddenFill xmlns="" xmlns:a14="http://schemas.microsoft.com/office/drawing/2010/main">
                 <a:solidFill>
                   <a:srgbClr val="FFFFFF"/>
                 </a:solidFill>
               </a14:hiddenFill>
             </a:ext>
             <a:ext uri="{91240B29-F687-4f45-9708-019B960494DF}">
-              <a14:hiddenLine xmlns:a14="http://schemas.microsoft.com/office/drawing/2010/main" xmlns="" w="9525">
+              <a14:hiddenLine xmlns="" xmlns:a14="http://schemas.microsoft.com/office/drawing/2010/main" w="9525">
                 <a:solidFill>
                   <a:srgbClr val="000000"/>
                 </a:solidFill>
@@ -17725,7 +17726,7 @@
           </a:ln>
           <a:extLst>
             <a:ext uri="{909E8E84-426E-40dd-AFC4-6F175D3DCCD1}">
-              <a14:hiddenFill xmlns:a14="http://schemas.microsoft.com/office/drawing/2010/main" xmlns="">
+              <a14:hiddenFill xmlns="" xmlns:a14="http://schemas.microsoft.com/office/drawing/2010/main">
                 <a:noFill/>
               </a14:hiddenFill>
             </a:ext>
@@ -17813,7 +17814,7 @@
           </a:ln>
           <a:extLst>
             <a:ext uri="{909E8E84-426E-40dd-AFC4-6F175D3DCCD1}">
-              <a14:hiddenFill xmlns:a14="http://schemas.microsoft.com/office/drawing/2010/main" xmlns="">
+              <a14:hiddenFill xmlns="" xmlns:a14="http://schemas.microsoft.com/office/drawing/2010/main">
                 <a:noFill/>
               </a14:hiddenFill>
             </a:ext>
@@ -17994,7 +17995,7 @@
           </a:ln>
           <a:extLst>
             <a:ext uri="{909E8E84-426E-40dd-AFC4-6F175D3DCCD1}">
-              <a14:hiddenFill xmlns:a14="http://schemas.microsoft.com/office/drawing/2010/main" xmlns="">
+              <a14:hiddenFill xmlns="" xmlns:a14="http://schemas.microsoft.com/office/drawing/2010/main">
                 <a:noFill/>
               </a14:hiddenFill>
             </a:ext>
@@ -18039,7 +18040,7 @@
           </a:ln>
           <a:extLst>
             <a:ext uri="{909E8E84-426E-40dd-AFC4-6F175D3DCCD1}">
-              <a14:hiddenFill xmlns:a14="http://schemas.microsoft.com/office/drawing/2010/main" xmlns="">
+              <a14:hiddenFill xmlns="" xmlns:a14="http://schemas.microsoft.com/office/drawing/2010/main">
                 <a:noFill/>
               </a14:hiddenFill>
             </a:ext>
@@ -18084,7 +18085,7 @@
           </a:ln>
           <a:extLst>
             <a:ext uri="{909E8E84-426E-40dd-AFC4-6F175D3DCCD1}">
-              <a14:hiddenFill xmlns:a14="http://schemas.microsoft.com/office/drawing/2010/main" xmlns="">
+              <a14:hiddenFill xmlns="" xmlns:a14="http://schemas.microsoft.com/office/drawing/2010/main">
                 <a:noFill/>
               </a14:hiddenFill>
             </a:ext>
@@ -18124,14 +18125,14 @@
           </a:ln>
           <a:extLst>
             <a:ext uri="{909E8E84-426E-40dd-AFC4-6F175D3DCCD1}">
-              <a14:hiddenFill xmlns:a14="http://schemas.microsoft.com/office/drawing/2010/main" xmlns="">
+              <a14:hiddenFill xmlns="" xmlns:a14="http://schemas.microsoft.com/office/drawing/2010/main">
                 <a:solidFill>
                   <a:srgbClr val="FFFFFF"/>
                 </a:solidFill>
               </a14:hiddenFill>
             </a:ext>
             <a:ext uri="{91240B29-F687-4f45-9708-019B960494DF}">
-              <a14:hiddenLine xmlns:a14="http://schemas.microsoft.com/office/drawing/2010/main" xmlns="" w="9525">
+              <a14:hiddenLine xmlns="" xmlns:a14="http://schemas.microsoft.com/office/drawing/2010/main" w="9525">
                 <a:solidFill>
                   <a:srgbClr val="000000"/>
                 </a:solidFill>
@@ -18279,14 +18280,14 @@
           </a:ln>
           <a:extLst>
             <a:ext uri="{909E8E84-426E-40dd-AFC4-6F175D3DCCD1}">
-              <a14:hiddenFill xmlns:a14="http://schemas.microsoft.com/office/drawing/2010/main" xmlns="">
+              <a14:hiddenFill xmlns="" xmlns:a14="http://schemas.microsoft.com/office/drawing/2010/main">
                 <a:solidFill>
                   <a:srgbClr val="FFFFFF"/>
                 </a:solidFill>
               </a14:hiddenFill>
             </a:ext>
             <a:ext uri="{91240B29-F687-4f45-9708-019B960494DF}">
-              <a14:hiddenLine xmlns:a14="http://schemas.microsoft.com/office/drawing/2010/main" xmlns="" w="9525">
+              <a14:hiddenLine xmlns="" xmlns:a14="http://schemas.microsoft.com/office/drawing/2010/main" w="9525">
                 <a:solidFill>
                   <a:srgbClr val="000000"/>
                 </a:solidFill>
@@ -18434,14 +18435,14 @@
           </a:ln>
           <a:extLst>
             <a:ext uri="{909E8E84-426E-40dd-AFC4-6F175D3DCCD1}">
-              <a14:hiddenFill xmlns:a14="http://schemas.microsoft.com/office/drawing/2010/main" xmlns="">
+              <a14:hiddenFill xmlns="" xmlns:a14="http://schemas.microsoft.com/office/drawing/2010/main">
                 <a:solidFill>
                   <a:srgbClr val="FFFFFF"/>
                 </a:solidFill>
               </a14:hiddenFill>
             </a:ext>
             <a:ext uri="{91240B29-F687-4f45-9708-019B960494DF}">
-              <a14:hiddenLine xmlns:a14="http://schemas.microsoft.com/office/drawing/2010/main" xmlns="" w="9525">
+              <a14:hiddenLine xmlns="" xmlns:a14="http://schemas.microsoft.com/office/drawing/2010/main" w="9525">
                 <a:solidFill>
                   <a:srgbClr val="000000"/>
                 </a:solidFill>
@@ -18589,14 +18590,14 @@
           </a:ln>
           <a:extLst>
             <a:ext uri="{909E8E84-426E-40dd-AFC4-6F175D3DCCD1}">
-              <a14:hiddenFill xmlns:a14="http://schemas.microsoft.com/office/drawing/2010/main" xmlns="">
+              <a14:hiddenFill xmlns="" xmlns:a14="http://schemas.microsoft.com/office/drawing/2010/main">
                 <a:solidFill>
                   <a:srgbClr val="FFFFFF"/>
                 </a:solidFill>
               </a14:hiddenFill>
             </a:ext>
             <a:ext uri="{91240B29-F687-4f45-9708-019B960494DF}">
-              <a14:hiddenLine xmlns:a14="http://schemas.microsoft.com/office/drawing/2010/main" xmlns="" w="9525">
+              <a14:hiddenLine xmlns="" xmlns:a14="http://schemas.microsoft.com/office/drawing/2010/main" w="9525">
                 <a:solidFill>
                   <a:srgbClr val="000000"/>
                 </a:solidFill>
@@ -18744,14 +18745,14 @@
           </a:ln>
           <a:extLst>
             <a:ext uri="{909E8E84-426E-40dd-AFC4-6F175D3DCCD1}">
-              <a14:hiddenFill xmlns:a14="http://schemas.microsoft.com/office/drawing/2010/main" xmlns="">
+              <a14:hiddenFill xmlns="" xmlns:a14="http://schemas.microsoft.com/office/drawing/2010/main">
                 <a:solidFill>
                   <a:srgbClr val="FFFFFF"/>
                 </a:solidFill>
               </a14:hiddenFill>
             </a:ext>
             <a:ext uri="{91240B29-F687-4f45-9708-019B960494DF}">
-              <a14:hiddenLine xmlns:a14="http://schemas.microsoft.com/office/drawing/2010/main" xmlns="" w="9525">
+              <a14:hiddenLine xmlns="" xmlns:a14="http://schemas.microsoft.com/office/drawing/2010/main" w="9525">
                 <a:solidFill>
                   <a:srgbClr val="000000"/>
                 </a:solidFill>
@@ -18953,7 +18954,7 @@
           </a:ln>
           <a:extLst>
             <a:ext uri="{909E8E84-426E-40dd-AFC4-6F175D3DCCD1}">
-              <a14:hiddenFill xmlns:a14="http://schemas.microsoft.com/office/drawing/2010/main" xmlns="">
+              <a14:hiddenFill xmlns="" xmlns:a14="http://schemas.microsoft.com/office/drawing/2010/main">
                 <a:noFill/>
               </a14:hiddenFill>
             </a:ext>
@@ -18993,14 +18994,14 @@
           </a:ln>
           <a:extLst>
             <a:ext uri="{909E8E84-426E-40dd-AFC4-6F175D3DCCD1}">
-              <a14:hiddenFill xmlns:a14="http://schemas.microsoft.com/office/drawing/2010/main" xmlns="">
+              <a14:hiddenFill xmlns="" xmlns:a14="http://schemas.microsoft.com/office/drawing/2010/main">
                 <a:solidFill>
                   <a:srgbClr val="FFFFFF"/>
                 </a:solidFill>
               </a14:hiddenFill>
             </a:ext>
             <a:ext uri="{91240B29-F687-4f45-9708-019B960494DF}">
-              <a14:hiddenLine xmlns:a14="http://schemas.microsoft.com/office/drawing/2010/main" xmlns="" w="9525">
+              <a14:hiddenLine xmlns="" xmlns:a14="http://schemas.microsoft.com/office/drawing/2010/main" w="9525">
                 <a:solidFill>
                   <a:srgbClr val="000000"/>
                 </a:solidFill>
@@ -19155,14 +19156,14 @@
           </a:ln>
           <a:extLst>
             <a:ext uri="{909E8E84-426E-40dd-AFC4-6F175D3DCCD1}">
-              <a14:hiddenFill xmlns:a14="http://schemas.microsoft.com/office/drawing/2010/main" xmlns="">
+              <a14:hiddenFill xmlns="" xmlns:a14="http://schemas.microsoft.com/office/drawing/2010/main">
                 <a:solidFill>
                   <a:srgbClr val="FFFFFF"/>
                 </a:solidFill>
               </a14:hiddenFill>
             </a:ext>
             <a:ext uri="{91240B29-F687-4f45-9708-019B960494DF}">
-              <a14:hiddenLine xmlns:a14="http://schemas.microsoft.com/office/drawing/2010/main" xmlns="" w="9525">
+              <a14:hiddenLine xmlns="" xmlns:a14="http://schemas.microsoft.com/office/drawing/2010/main" w="9525">
                 <a:solidFill>
                   <a:srgbClr val="000000"/>
                 </a:solidFill>
@@ -21680,13 +21681,15 @@
         </p:nvSpPr>
         <p:spPr/>
         <p:txBody>
-          <a:bodyPr/>
+          <a:bodyPr>
+            <a:normAutofit/>
+          </a:bodyPr>
           <a:lstStyle/>
           <a:p>
             <a:pPr eaLnBrk="1" hangingPunct="1"/>
             <a:r>
-              <a:rPr lang="en-US"/>
-              <a:t>Coming Attractions</a:t>
+              <a:rPr lang="en-US" dirty="0"/>
+              <a:t>Wrap Up</a:t>
             </a:r>
           </a:p>
         </p:txBody>
@@ -21707,71 +21710,36 @@
         <p:spPr/>
         <p:txBody>
           <a:bodyPr>
-            <a:normAutofit fontScale="92500" lnSpcReduction="10000"/>
+            <a:normAutofit/>
           </a:bodyPr>
           <a:lstStyle/>
           <a:p>
-            <a:pPr eaLnBrk="1" hangingPunct="1">
+            <a:pPr>
               <a:defRPr/>
             </a:pPr>
             <a:r>
               <a:rPr lang="en-US" dirty="0"/>
-              <a:t>Survey of compiler “optimizations”</a:t>
-            </a:r>
-          </a:p>
-          <a:p>
-            <a:pPr lvl="1">
+              <a:t>In this class we have covered the front-end of a compiler.</a:t>
+            </a:r>
+          </a:p>
+          <a:p>
+            <a:pPr eaLnBrk="1" hangingPunct="1">
+              <a:buFont typeface="Arial" panose="020B0604020202020204" pitchFamily="34" charset="0"/>
+              <a:buChar char="•"/>
+              <a:defRPr/>
+            </a:pPr>
+            <a:r>
+              <a:rPr lang="en-US" dirty="0"/>
+              <a:t>Graduate level studies often cover more kinds of compiler optimizations and work in the back end of the compiler</a:t>
+            </a:r>
+          </a:p>
+          <a:p>
+            <a:pPr eaLnBrk="1" hangingPunct="1">
+              <a:buFont typeface="Arial" panose="020B0604020202020204" pitchFamily="34" charset="0"/>
+              <a:buChar char="•"/>
               <a:defRPr/>
             </a:pPr>
             <a:endParaRPr lang="en-US" dirty="0"/>
-          </a:p>
-          <a:p>
-            <a:pPr>
-              <a:defRPr/>
-            </a:pPr>
-            <a:r>
-              <a:rPr lang="en-US" dirty="0"/>
-              <a:t>Analysis and transformation algorithms for optimizations (including SSA IR)</a:t>
-            </a:r>
-          </a:p>
-          <a:p>
-            <a:pPr lvl="1">
-              <a:defRPr/>
-            </a:pPr>
-            <a:endParaRPr lang="en-US" dirty="0"/>
-          </a:p>
-          <a:p>
-            <a:pPr>
-              <a:defRPr/>
-            </a:pPr>
-            <a:r>
-              <a:rPr lang="en-US" dirty="0"/>
-              <a:t>Back-end organization in production compilers</a:t>
-            </a:r>
-          </a:p>
-          <a:p>
-            <a:pPr lvl="1">
-              <a:defRPr/>
-            </a:pPr>
-            <a:r>
-              <a:rPr lang="en-US" dirty="0"/>
-              <a:t>Instruction selection and scheduling, register allocation</a:t>
-            </a:r>
-          </a:p>
-          <a:p>
-            <a:pPr lvl="1">
-              <a:defRPr/>
-            </a:pPr>
-            <a:endParaRPr lang="en-US" dirty="0"/>
-          </a:p>
-          <a:p>
-            <a:pPr>
-              <a:defRPr/>
-            </a:pPr>
-            <a:r>
-              <a:rPr lang="en-US" dirty="0"/>
-              <a:t>Other topics depending on time</a:t>
-            </a:r>
           </a:p>
         </p:txBody>
       </p:sp>
@@ -21793,14 +21761,14 @@
           <a:ln/>
           <a:extLst>
             <a:ext uri="{909E8E84-426E-40dd-AFC4-6F175D3DCCD1}">
-              <a14:hiddenFill xmlns:a14="http://schemas.microsoft.com/office/drawing/2010/main" xmlns="">
+              <a14:hiddenFill xmlns="" xmlns:a14="http://schemas.microsoft.com/office/drawing/2010/main">
                 <a:solidFill>
                   <a:srgbClr val="FFFFFF"/>
                 </a:solidFill>
               </a14:hiddenFill>
             </a:ext>
             <a:ext uri="{91240B29-F687-4f45-9708-019B960494DF}">
-              <a14:hiddenLine xmlns:a14="http://schemas.microsoft.com/office/drawing/2010/main" xmlns="" w="9525">
+              <a14:hiddenLine xmlns="" xmlns:a14="http://schemas.microsoft.com/office/drawing/2010/main" w="9525">
                 <a:solidFill>
                   <a:srgbClr val="000000"/>
                 </a:solidFill>
@@ -21938,14 +21906,14 @@
           <a:ln/>
           <a:extLst>
             <a:ext uri="{909E8E84-426E-40dd-AFC4-6F175D3DCCD1}">
-              <a14:hiddenFill xmlns:a14="http://schemas.microsoft.com/office/drawing/2010/main" xmlns="">
+              <a14:hiddenFill xmlns="" xmlns:a14="http://schemas.microsoft.com/office/drawing/2010/main">
                 <a:solidFill>
                   <a:srgbClr val="FFFFFF"/>
                 </a:solidFill>
               </a14:hiddenFill>
             </a:ext>
             <a:ext uri="{91240B29-F687-4f45-9708-019B960494DF}">
-              <a14:hiddenLine xmlns:a14="http://schemas.microsoft.com/office/drawing/2010/main" xmlns="" w="9525">
+              <a14:hiddenLine xmlns="" xmlns:a14="http://schemas.microsoft.com/office/drawing/2010/main" w="9525">
                 <a:solidFill>
                   <a:srgbClr val="000000"/>
                 </a:solidFill>
@@ -22071,6 +22039,2033 @@
         </p:txBody>
       </p:sp>
     </p:spTree>
+  </p:cSld>
+  <p:clrMapOvr>
+    <a:masterClrMapping/>
+  </p:clrMapOvr>
+</p:sld>
+</file>
+
+<file path=ppt/slides/slide35.xml><?xml version="1.0" encoding="utf-8"?>
+<p:sld xmlns:a="http://schemas.openxmlformats.org/drawingml/2006/main" xmlns:r="http://schemas.openxmlformats.org/officeDocument/2006/relationships" xmlns:p="http://schemas.openxmlformats.org/presentationml/2006/main">
+  <p:cSld>
+    <p:spTree>
+      <p:nvGrpSpPr>
+        <p:cNvPr id="1" name=""/>
+        <p:cNvGrpSpPr/>
+        <p:nvPr/>
+      </p:nvGrpSpPr>
+      <p:grpSpPr>
+        <a:xfrm>
+          <a:off x="0" y="0"/>
+          <a:ext cx="0" cy="0"/>
+          <a:chOff x="0" y="0"/>
+          <a:chExt cx="0" cy="0"/>
+        </a:xfrm>
+      </p:grpSpPr>
+      <p:sp>
+        <p:nvSpPr>
+          <p:cNvPr id="5125" name="Rectangle 2"/>
+          <p:cNvSpPr>
+            <a:spLocks noGrp="1" noChangeArrowheads="1"/>
+          </p:cNvSpPr>
+          <p:nvPr>
+            <p:ph type="title"/>
+            <p:custDataLst>
+              <p:tags r:id="rId1"/>
+            </p:custDataLst>
+          </p:nvPr>
+        </p:nvSpPr>
+        <p:spPr/>
+        <p:txBody>
+          <a:bodyPr/>
+          <a:lstStyle/>
+          <a:p>
+            <a:pPr eaLnBrk="1" hangingPunct="1"/>
+            <a:r>
+              <a:rPr lang="en-US" dirty="0"/>
+              <a:t>The End</a:t>
+            </a:r>
+          </a:p>
+        </p:txBody>
+      </p:sp>
+      <p:sp>
+        <p:nvSpPr>
+          <p:cNvPr id="5123" name="Footer Placeholder 4"/>
+          <p:cNvSpPr>
+            <a:spLocks noGrp="1"/>
+          </p:cNvSpPr>
+          <p:nvPr>
+            <p:ph type="ftr" sz="quarter" idx="11"/>
+            <p:custDataLst>
+              <p:tags r:id="rId2"/>
+            </p:custDataLst>
+          </p:nvPr>
+        </p:nvSpPr>
+        <p:spPr>
+          <a:noFill/>
+          <a:ln/>
+          <a:extLst>
+            <a:ext uri="{909E8E84-426E-40dd-AFC4-6F175D3DCCD1}">
+              <a14:hiddenFill xmlns="" xmlns:a14="http://schemas.microsoft.com/office/drawing/2010/main">
+                <a:solidFill>
+                  <a:srgbClr val="FFFFFF"/>
+                </a:solidFill>
+              </a14:hiddenFill>
+            </a:ext>
+            <a:ext uri="{91240B29-F687-4f45-9708-019B960494DF}">
+              <a14:hiddenLine xmlns="" xmlns:a14="http://schemas.microsoft.com/office/drawing/2010/main" w="9525">
+                <a:solidFill>
+                  <a:srgbClr val="000000"/>
+                </a:solidFill>
+                <a:miter lim="800000"/>
+                <a:headEnd/>
+                <a:tailEnd/>
+              </a14:hiddenLine>
+            </a:ext>
+          </a:extLst>
+        </p:spPr>
+        <p:txBody>
+          <a:bodyPr/>
+          <a:lstStyle>
+            <a:lvl1pPr>
+              <a:defRPr>
+                <a:solidFill>
+                  <a:schemeClr val="tx1"/>
+                </a:solidFill>
+                <a:latin typeface="Tahoma" charset="0"/>
+              </a:defRPr>
+            </a:lvl1pPr>
+            <a:lvl2pPr marL="742950" indent="-285750">
+              <a:defRPr>
+                <a:solidFill>
+                  <a:schemeClr val="tx1"/>
+                </a:solidFill>
+                <a:latin typeface="Tahoma" charset="0"/>
+              </a:defRPr>
+            </a:lvl2pPr>
+            <a:lvl3pPr marL="1143000" indent="-228600">
+              <a:defRPr>
+                <a:solidFill>
+                  <a:schemeClr val="tx1"/>
+                </a:solidFill>
+                <a:latin typeface="Tahoma" charset="0"/>
+              </a:defRPr>
+            </a:lvl3pPr>
+            <a:lvl4pPr marL="1600200" indent="-228600">
+              <a:defRPr>
+                <a:solidFill>
+                  <a:schemeClr val="tx1"/>
+                </a:solidFill>
+                <a:latin typeface="Tahoma" charset="0"/>
+              </a:defRPr>
+            </a:lvl4pPr>
+            <a:lvl5pPr marL="2057400" indent="-228600">
+              <a:defRPr>
+                <a:solidFill>
+                  <a:schemeClr val="tx1"/>
+                </a:solidFill>
+                <a:latin typeface="Tahoma" charset="0"/>
+              </a:defRPr>
+            </a:lvl5pPr>
+            <a:lvl6pPr marL="2514600" indent="-228600" algn="ctr" eaLnBrk="0" fontAlgn="base" hangingPunct="0">
+              <a:spcBef>
+                <a:spcPct val="0"/>
+              </a:spcBef>
+              <a:spcAft>
+                <a:spcPct val="0"/>
+              </a:spcAft>
+              <a:defRPr>
+                <a:solidFill>
+                  <a:schemeClr val="tx1"/>
+                </a:solidFill>
+                <a:latin typeface="Tahoma" charset="0"/>
+              </a:defRPr>
+            </a:lvl6pPr>
+            <a:lvl7pPr marL="2971800" indent="-228600" algn="ctr" eaLnBrk="0" fontAlgn="base" hangingPunct="0">
+              <a:spcBef>
+                <a:spcPct val="0"/>
+              </a:spcBef>
+              <a:spcAft>
+                <a:spcPct val="0"/>
+              </a:spcAft>
+              <a:defRPr>
+                <a:solidFill>
+                  <a:schemeClr val="tx1"/>
+                </a:solidFill>
+                <a:latin typeface="Tahoma" charset="0"/>
+              </a:defRPr>
+            </a:lvl7pPr>
+            <a:lvl8pPr marL="3429000" indent="-228600" algn="ctr" eaLnBrk="0" fontAlgn="base" hangingPunct="0">
+              <a:spcBef>
+                <a:spcPct val="0"/>
+              </a:spcBef>
+              <a:spcAft>
+                <a:spcPct val="0"/>
+              </a:spcAft>
+              <a:defRPr>
+                <a:solidFill>
+                  <a:schemeClr val="tx1"/>
+                </a:solidFill>
+                <a:latin typeface="Tahoma" charset="0"/>
+              </a:defRPr>
+            </a:lvl8pPr>
+            <a:lvl9pPr marL="3886200" indent="-228600" algn="ctr" eaLnBrk="0" fontAlgn="base" hangingPunct="0">
+              <a:spcBef>
+                <a:spcPct val="0"/>
+              </a:spcBef>
+              <a:spcAft>
+                <a:spcPct val="0"/>
+              </a:spcAft>
+              <a:defRPr>
+                <a:solidFill>
+                  <a:schemeClr val="tx1"/>
+                </a:solidFill>
+                <a:latin typeface="Tahoma" charset="0"/>
+              </a:defRPr>
+            </a:lvl9pPr>
+          </a:lstStyle>
+          <a:p>
+            <a:r>
+              <a:rPr lang="pl-PL" dirty="0"/>
+              <a:t>Compiler Design</a:t>
+            </a:r>
+            <a:endParaRPr lang="en-US" dirty="0"/>
+          </a:p>
+        </p:txBody>
+      </p:sp>
+      <p:sp>
+        <p:nvSpPr>
+          <p:cNvPr id="5124" name="Slide Number Placeholder 5"/>
+          <p:cNvSpPr>
+            <a:spLocks noGrp="1"/>
+          </p:cNvSpPr>
+          <p:nvPr>
+            <p:ph type="sldNum" sz="quarter" idx="12"/>
+            <p:custDataLst>
+              <p:tags r:id="rId3"/>
+            </p:custDataLst>
+          </p:nvPr>
+        </p:nvSpPr>
+        <p:spPr>
+          <a:noFill/>
+          <a:ln/>
+          <a:extLst>
+            <a:ext uri="{909E8E84-426E-40dd-AFC4-6F175D3DCCD1}">
+              <a14:hiddenFill xmlns="" xmlns:a14="http://schemas.microsoft.com/office/drawing/2010/main">
+                <a:solidFill>
+                  <a:srgbClr val="FFFFFF"/>
+                </a:solidFill>
+              </a14:hiddenFill>
+            </a:ext>
+            <a:ext uri="{91240B29-F687-4f45-9708-019B960494DF}">
+              <a14:hiddenLine xmlns="" xmlns:a14="http://schemas.microsoft.com/office/drawing/2010/main" w="9525">
+                <a:solidFill>
+                  <a:srgbClr val="000000"/>
+                </a:solidFill>
+                <a:miter lim="800000"/>
+                <a:headEnd/>
+                <a:tailEnd/>
+              </a14:hiddenLine>
+            </a:ext>
+          </a:extLst>
+        </p:spPr>
+        <p:txBody>
+          <a:bodyPr/>
+          <a:lstStyle>
+            <a:lvl1pPr>
+              <a:defRPr>
+                <a:solidFill>
+                  <a:schemeClr val="tx1"/>
+                </a:solidFill>
+                <a:latin typeface="Tahoma" charset="0"/>
+              </a:defRPr>
+            </a:lvl1pPr>
+            <a:lvl2pPr marL="742950" indent="-285750">
+              <a:defRPr>
+                <a:solidFill>
+                  <a:schemeClr val="tx1"/>
+                </a:solidFill>
+                <a:latin typeface="Tahoma" charset="0"/>
+              </a:defRPr>
+            </a:lvl2pPr>
+            <a:lvl3pPr marL="1143000" indent="-228600">
+              <a:defRPr>
+                <a:solidFill>
+                  <a:schemeClr val="tx1"/>
+                </a:solidFill>
+                <a:latin typeface="Tahoma" charset="0"/>
+              </a:defRPr>
+            </a:lvl3pPr>
+            <a:lvl4pPr marL="1600200" indent="-228600">
+              <a:defRPr>
+                <a:solidFill>
+                  <a:schemeClr val="tx1"/>
+                </a:solidFill>
+                <a:latin typeface="Tahoma" charset="0"/>
+              </a:defRPr>
+            </a:lvl4pPr>
+            <a:lvl5pPr marL="2057400" indent="-228600">
+              <a:defRPr>
+                <a:solidFill>
+                  <a:schemeClr val="tx1"/>
+                </a:solidFill>
+                <a:latin typeface="Tahoma" charset="0"/>
+              </a:defRPr>
+            </a:lvl5pPr>
+            <a:lvl6pPr marL="2514600" indent="-228600" algn="ctr" eaLnBrk="0" fontAlgn="base" hangingPunct="0">
+              <a:spcBef>
+                <a:spcPct val="0"/>
+              </a:spcBef>
+              <a:spcAft>
+                <a:spcPct val="0"/>
+              </a:spcAft>
+              <a:defRPr>
+                <a:solidFill>
+                  <a:schemeClr val="tx1"/>
+                </a:solidFill>
+                <a:latin typeface="Tahoma" charset="0"/>
+              </a:defRPr>
+            </a:lvl6pPr>
+            <a:lvl7pPr marL="2971800" indent="-228600" algn="ctr" eaLnBrk="0" fontAlgn="base" hangingPunct="0">
+              <a:spcBef>
+                <a:spcPct val="0"/>
+              </a:spcBef>
+              <a:spcAft>
+                <a:spcPct val="0"/>
+              </a:spcAft>
+              <a:defRPr>
+                <a:solidFill>
+                  <a:schemeClr val="tx1"/>
+                </a:solidFill>
+                <a:latin typeface="Tahoma" charset="0"/>
+              </a:defRPr>
+            </a:lvl7pPr>
+            <a:lvl8pPr marL="3429000" indent="-228600" algn="ctr" eaLnBrk="0" fontAlgn="base" hangingPunct="0">
+              <a:spcBef>
+                <a:spcPct val="0"/>
+              </a:spcBef>
+              <a:spcAft>
+                <a:spcPct val="0"/>
+              </a:spcAft>
+              <a:defRPr>
+                <a:solidFill>
+                  <a:schemeClr val="tx1"/>
+                </a:solidFill>
+                <a:latin typeface="Tahoma" charset="0"/>
+              </a:defRPr>
+            </a:lvl8pPr>
+            <a:lvl9pPr marL="3886200" indent="-228600" algn="ctr" eaLnBrk="0" fontAlgn="base" hangingPunct="0">
+              <a:spcBef>
+                <a:spcPct val="0"/>
+              </a:spcBef>
+              <a:spcAft>
+                <a:spcPct val="0"/>
+              </a:spcAft>
+              <a:defRPr>
+                <a:solidFill>
+                  <a:schemeClr val="tx1"/>
+                </a:solidFill>
+                <a:latin typeface="Tahoma" charset="0"/>
+              </a:defRPr>
+            </a:lvl9pPr>
+          </a:lstStyle>
+          <a:p>
+            <a:r>
+              <a:rPr lang="en-US"/>
+              <a:t>G-</a:t>
+            </a:r>
+            <a:fld id="{D8C8AABC-2111-46D3-AE7C-F7DC70BBB575}" type="slidenum">
+              <a:rPr lang="en-US" smtClean="0"/>
+              <a:pPr/>
+              <a:t>35</a:t>
+            </a:fld>
+            <a:endParaRPr lang="en-US"/>
+          </a:p>
+        </p:txBody>
+      </p:sp>
+      <p:sp>
+        <p:nvSpPr>
+          <p:cNvPr id="5126" name="Oval 4"/>
+          <p:cNvSpPr>
+            <a:spLocks noChangeArrowheads="1"/>
+          </p:cNvSpPr>
+          <p:nvPr>
+            <p:custDataLst>
+              <p:tags r:id="rId4"/>
+            </p:custDataLst>
+          </p:nvPr>
+        </p:nvSpPr>
+        <p:spPr bwMode="auto">
+          <a:xfrm>
+            <a:off x="990600" y="4648200"/>
+            <a:ext cx="1295400" cy="838200"/>
+          </a:xfrm>
+          <a:prstGeom prst="ellipse">
+            <a:avLst/>
+          </a:prstGeom>
+          <a:solidFill>
+            <a:schemeClr val="accent1"/>
+          </a:solidFill>
+          <a:ln w="9525">
+            <a:solidFill>
+              <a:schemeClr val="tx1"/>
+            </a:solidFill>
+            <a:round/>
+            <a:headEnd/>
+            <a:tailEnd/>
+          </a:ln>
+        </p:spPr>
+        <p:txBody>
+          <a:bodyPr wrap="none" anchor="ctr"/>
+          <a:lstStyle/>
+          <a:p>
+            <a:r>
+              <a:rPr lang="en-US"/>
+              <a:t>Source</a:t>
+            </a:r>
+          </a:p>
+        </p:txBody>
+      </p:sp>
+      <p:sp>
+        <p:nvSpPr>
+          <p:cNvPr id="5127" name="Oval 5"/>
+          <p:cNvSpPr>
+            <a:spLocks noChangeArrowheads="1"/>
+          </p:cNvSpPr>
+          <p:nvPr>
+            <p:custDataLst>
+              <p:tags r:id="rId5"/>
+            </p:custDataLst>
+          </p:nvPr>
+        </p:nvSpPr>
+        <p:spPr bwMode="auto">
+          <a:xfrm>
+            <a:off x="5486400" y="4648200"/>
+            <a:ext cx="1295400" cy="838200"/>
+          </a:xfrm>
+          <a:prstGeom prst="ellipse">
+            <a:avLst/>
+          </a:prstGeom>
+          <a:solidFill>
+            <a:schemeClr val="accent1"/>
+          </a:solidFill>
+          <a:ln w="9525">
+            <a:solidFill>
+              <a:schemeClr val="tx1"/>
+            </a:solidFill>
+            <a:round/>
+            <a:headEnd/>
+            <a:tailEnd/>
+          </a:ln>
+        </p:spPr>
+        <p:txBody>
+          <a:bodyPr wrap="none" anchor="ctr"/>
+          <a:lstStyle/>
+          <a:p>
+            <a:r>
+              <a:rPr lang="en-US"/>
+              <a:t>Target</a:t>
+            </a:r>
+          </a:p>
+        </p:txBody>
+      </p:sp>
+      <p:sp>
+        <p:nvSpPr>
+          <p:cNvPr id="5128" name="Line 8"/>
+          <p:cNvSpPr>
+            <a:spLocks noChangeShapeType="1"/>
+          </p:cNvSpPr>
+          <p:nvPr>
+            <p:custDataLst>
+              <p:tags r:id="rId6"/>
+            </p:custDataLst>
+          </p:nvPr>
+        </p:nvSpPr>
+        <p:spPr bwMode="auto">
+          <a:xfrm flipV="1">
+            <a:off x="1676400" y="4114800"/>
+            <a:ext cx="0" cy="533400"/>
+          </a:xfrm>
+          <a:prstGeom prst="line">
+            <a:avLst/>
+          </a:prstGeom>
+          <a:noFill/>
+          <a:ln w="57150">
+            <a:solidFill>
+              <a:schemeClr val="tx2"/>
+            </a:solidFill>
+            <a:round/>
+            <a:headEnd/>
+            <a:tailEnd type="triangle" w="med" len="med"/>
+          </a:ln>
+          <a:extLst>
+            <a:ext uri="{909E8E84-426E-40dd-AFC4-6F175D3DCCD1}">
+              <a14:hiddenFill xmlns="" xmlns:a14="http://schemas.microsoft.com/office/drawing/2010/main">
+                <a:noFill/>
+              </a14:hiddenFill>
+            </a:ext>
+          </a:extLst>
+        </p:spPr>
+        <p:txBody>
+          <a:bodyPr/>
+          <a:lstStyle/>
+          <a:p>
+            <a:endParaRPr lang="en-US"/>
+          </a:p>
+        </p:txBody>
+      </p:sp>
+      <p:sp>
+        <p:nvSpPr>
+          <p:cNvPr id="5129" name="Rectangle 11"/>
+          <p:cNvSpPr>
+            <a:spLocks noChangeArrowheads="1"/>
+          </p:cNvSpPr>
+          <p:nvPr>
+            <p:custDataLst>
+              <p:tags r:id="rId7"/>
+            </p:custDataLst>
+          </p:nvPr>
+        </p:nvSpPr>
+        <p:spPr bwMode="auto">
+          <a:xfrm>
+            <a:off x="1066800" y="3429000"/>
+            <a:ext cx="1295400" cy="685800"/>
+          </a:xfrm>
+          <a:prstGeom prst="rect">
+            <a:avLst/>
+          </a:prstGeom>
+          <a:solidFill>
+            <a:schemeClr val="accent1"/>
+          </a:solidFill>
+          <a:ln w="9525">
+            <a:solidFill>
+              <a:schemeClr val="tx1"/>
+            </a:solidFill>
+            <a:miter lim="800000"/>
+            <a:headEnd/>
+            <a:tailEnd/>
+          </a:ln>
+        </p:spPr>
+        <p:txBody>
+          <a:bodyPr wrap="none" anchor="ctr"/>
+          <a:lstStyle/>
+          <a:p>
+            <a:r>
+              <a:rPr lang="en-US"/>
+              <a:t>Scanner</a:t>
+            </a:r>
+          </a:p>
+        </p:txBody>
+      </p:sp>
+      <p:sp>
+        <p:nvSpPr>
+          <p:cNvPr id="5130" name="Line 13"/>
+          <p:cNvSpPr>
+            <a:spLocks noChangeShapeType="1"/>
+          </p:cNvSpPr>
+          <p:nvPr>
+            <p:custDataLst>
+              <p:tags r:id="rId8"/>
+            </p:custDataLst>
+          </p:nvPr>
+        </p:nvSpPr>
+        <p:spPr bwMode="auto">
+          <a:xfrm flipV="1">
+            <a:off x="1676400" y="2895600"/>
+            <a:ext cx="0" cy="533400"/>
+          </a:xfrm>
+          <a:prstGeom prst="line">
+            <a:avLst/>
+          </a:prstGeom>
+          <a:noFill/>
+          <a:ln w="57150">
+            <a:solidFill>
+              <a:schemeClr val="tx2"/>
+            </a:solidFill>
+            <a:round/>
+            <a:headEnd/>
+            <a:tailEnd type="triangle" w="med" len="med"/>
+          </a:ln>
+          <a:extLst>
+            <a:ext uri="{909E8E84-426E-40dd-AFC4-6F175D3DCCD1}">
+              <a14:hiddenFill xmlns="" xmlns:a14="http://schemas.microsoft.com/office/drawing/2010/main">
+                <a:noFill/>
+              </a14:hiddenFill>
+            </a:ext>
+          </a:extLst>
+        </p:spPr>
+        <p:txBody>
+          <a:bodyPr/>
+          <a:lstStyle/>
+          <a:p>
+            <a:endParaRPr lang="en-US"/>
+          </a:p>
+        </p:txBody>
+      </p:sp>
+      <p:sp>
+        <p:nvSpPr>
+          <p:cNvPr id="5131" name="Rectangle 14"/>
+          <p:cNvSpPr>
+            <a:spLocks noChangeArrowheads="1"/>
+          </p:cNvSpPr>
+          <p:nvPr>
+            <p:custDataLst>
+              <p:tags r:id="rId9"/>
+            </p:custDataLst>
+          </p:nvPr>
+        </p:nvSpPr>
+        <p:spPr bwMode="auto">
+          <a:xfrm>
+            <a:off x="1066800" y="2209800"/>
+            <a:ext cx="1295400" cy="685800"/>
+          </a:xfrm>
+          <a:prstGeom prst="rect">
+            <a:avLst/>
+          </a:prstGeom>
+          <a:solidFill>
+            <a:schemeClr val="accent1"/>
+          </a:solidFill>
+          <a:ln w="9525">
+            <a:solidFill>
+              <a:schemeClr val="tx1"/>
+            </a:solidFill>
+            <a:miter lim="800000"/>
+            <a:headEnd/>
+            <a:tailEnd/>
+          </a:ln>
+        </p:spPr>
+        <p:txBody>
+          <a:bodyPr wrap="none" anchor="ctr"/>
+          <a:lstStyle/>
+          <a:p>
+            <a:r>
+              <a:rPr lang="en-US" dirty="0"/>
+              <a:t>Parser</a:t>
+            </a:r>
+          </a:p>
+        </p:txBody>
+      </p:sp>
+      <p:sp>
+        <p:nvSpPr>
+          <p:cNvPr id="5132" name="Rectangle 15"/>
+          <p:cNvSpPr>
+            <a:spLocks noChangeArrowheads="1"/>
+          </p:cNvSpPr>
+          <p:nvPr>
+            <p:custDataLst>
+              <p:tags r:id="rId10"/>
+            </p:custDataLst>
+          </p:nvPr>
+        </p:nvSpPr>
+        <p:spPr bwMode="auto">
+          <a:xfrm>
+            <a:off x="5486400" y="2209800"/>
+            <a:ext cx="1295400" cy="685800"/>
+          </a:xfrm>
+          <a:prstGeom prst="rect">
+            <a:avLst/>
+          </a:prstGeom>
+          <a:solidFill>
+            <a:schemeClr val="accent1"/>
+          </a:solidFill>
+          <a:ln w="9525">
+            <a:solidFill>
+              <a:schemeClr val="tx1"/>
+            </a:solidFill>
+            <a:miter lim="800000"/>
+            <a:headEnd/>
+            <a:tailEnd/>
+          </a:ln>
+        </p:spPr>
+        <p:txBody>
+          <a:bodyPr wrap="none" anchor="ctr"/>
+          <a:lstStyle/>
+          <a:p>
+            <a:r>
+              <a:rPr lang="en-US" dirty="0"/>
+              <a:t>Middle</a:t>
+            </a:r>
+            <a:br>
+              <a:rPr lang="en-US" dirty="0"/>
+            </a:br>
+            <a:r>
+              <a:rPr lang="en-US" sz="1600" dirty="0"/>
+              <a:t>(optimization)</a:t>
+            </a:r>
+          </a:p>
+        </p:txBody>
+      </p:sp>
+      <p:sp>
+        <p:nvSpPr>
+          <p:cNvPr id="5133" name="Rectangle 16"/>
+          <p:cNvSpPr>
+            <a:spLocks noChangeArrowheads="1"/>
+          </p:cNvSpPr>
+          <p:nvPr>
+            <p:custDataLst>
+              <p:tags r:id="rId11"/>
+            </p:custDataLst>
+          </p:nvPr>
+        </p:nvSpPr>
+        <p:spPr bwMode="auto">
+          <a:xfrm>
+            <a:off x="5486400" y="3429000"/>
+            <a:ext cx="1295400" cy="685800"/>
+          </a:xfrm>
+          <a:prstGeom prst="rect">
+            <a:avLst/>
+          </a:prstGeom>
+          <a:solidFill>
+            <a:schemeClr val="accent1"/>
+          </a:solidFill>
+          <a:ln w="9525">
+            <a:solidFill>
+              <a:schemeClr val="tx1"/>
+            </a:solidFill>
+            <a:miter lim="800000"/>
+            <a:headEnd/>
+            <a:tailEnd/>
+          </a:ln>
+        </p:spPr>
+        <p:txBody>
+          <a:bodyPr wrap="none" anchor="ctr"/>
+          <a:lstStyle/>
+          <a:p>
+            <a:r>
+              <a:rPr lang="en-US"/>
+              <a:t>Code Gen</a:t>
+            </a:r>
+          </a:p>
+        </p:txBody>
+      </p:sp>
+      <p:sp>
+        <p:nvSpPr>
+          <p:cNvPr id="5134" name="Line 17"/>
+          <p:cNvSpPr>
+            <a:spLocks noChangeShapeType="1"/>
+          </p:cNvSpPr>
+          <p:nvPr>
+            <p:custDataLst>
+              <p:tags r:id="rId12"/>
+            </p:custDataLst>
+          </p:nvPr>
+        </p:nvSpPr>
+        <p:spPr bwMode="auto">
+          <a:xfrm>
+            <a:off x="6096000" y="2895600"/>
+            <a:ext cx="0" cy="533400"/>
+          </a:xfrm>
+          <a:prstGeom prst="line">
+            <a:avLst/>
+          </a:prstGeom>
+          <a:noFill/>
+          <a:ln w="57150">
+            <a:solidFill>
+              <a:schemeClr val="tx2"/>
+            </a:solidFill>
+            <a:round/>
+            <a:headEnd/>
+            <a:tailEnd type="triangle" w="med" len="med"/>
+          </a:ln>
+          <a:extLst>
+            <a:ext uri="{909E8E84-426E-40dd-AFC4-6F175D3DCCD1}">
+              <a14:hiddenFill xmlns="" xmlns:a14="http://schemas.microsoft.com/office/drawing/2010/main">
+                <a:noFill/>
+              </a14:hiddenFill>
+            </a:ext>
+          </a:extLst>
+        </p:spPr>
+        <p:txBody>
+          <a:bodyPr/>
+          <a:lstStyle/>
+          <a:p>
+            <a:endParaRPr lang="en-US"/>
+          </a:p>
+        </p:txBody>
+      </p:sp>
+      <p:sp>
+        <p:nvSpPr>
+          <p:cNvPr id="5135" name="Line 18"/>
+          <p:cNvSpPr>
+            <a:spLocks noChangeShapeType="1"/>
+          </p:cNvSpPr>
+          <p:nvPr>
+            <p:custDataLst>
+              <p:tags r:id="rId13"/>
+            </p:custDataLst>
+          </p:nvPr>
+        </p:nvSpPr>
+        <p:spPr bwMode="auto">
+          <a:xfrm>
+            <a:off x="6065837" y="4114800"/>
+            <a:ext cx="0" cy="533400"/>
+          </a:xfrm>
+          <a:prstGeom prst="line">
+            <a:avLst/>
+          </a:prstGeom>
+          <a:noFill/>
+          <a:ln w="57150">
+            <a:solidFill>
+              <a:schemeClr val="tx2"/>
+            </a:solidFill>
+            <a:round/>
+            <a:headEnd/>
+            <a:tailEnd type="triangle" w="med" len="med"/>
+          </a:ln>
+          <a:extLst>
+            <a:ext uri="{909E8E84-426E-40dd-AFC4-6F175D3DCCD1}">
+              <a14:hiddenFill xmlns="" xmlns:a14="http://schemas.microsoft.com/office/drawing/2010/main">
+                <a:noFill/>
+              </a14:hiddenFill>
+            </a:ext>
+          </a:extLst>
+        </p:spPr>
+        <p:txBody>
+          <a:bodyPr/>
+          <a:lstStyle/>
+          <a:p>
+            <a:endParaRPr lang="en-US"/>
+          </a:p>
+        </p:txBody>
+      </p:sp>
+      <p:sp>
+        <p:nvSpPr>
+          <p:cNvPr id="5136" name="Line 19"/>
+          <p:cNvSpPr>
+            <a:spLocks noChangeShapeType="1"/>
+          </p:cNvSpPr>
+          <p:nvPr>
+            <p:custDataLst>
+              <p:tags r:id="rId14"/>
+            </p:custDataLst>
+          </p:nvPr>
+        </p:nvSpPr>
+        <p:spPr bwMode="auto">
+          <a:xfrm flipV="1">
+            <a:off x="2362200" y="2590800"/>
+            <a:ext cx="914400" cy="0"/>
+          </a:xfrm>
+          <a:prstGeom prst="line">
+            <a:avLst/>
+          </a:prstGeom>
+          <a:noFill/>
+          <a:ln w="57150">
+            <a:solidFill>
+              <a:schemeClr val="tx2"/>
+            </a:solidFill>
+            <a:round/>
+            <a:headEnd/>
+            <a:tailEnd type="triangle" w="med" len="med"/>
+          </a:ln>
+          <a:extLst>
+            <a:ext uri="{909E8E84-426E-40dd-AFC4-6F175D3DCCD1}">
+              <a14:hiddenFill xmlns="" xmlns:a14="http://schemas.microsoft.com/office/drawing/2010/main">
+                <a:noFill/>
+              </a14:hiddenFill>
+            </a:ext>
+          </a:extLst>
+        </p:spPr>
+        <p:txBody>
+          <a:bodyPr/>
+          <a:lstStyle/>
+          <a:p>
+            <a:endParaRPr lang="en-US"/>
+          </a:p>
+        </p:txBody>
+      </p:sp>
+      <p:sp>
+        <p:nvSpPr>
+          <p:cNvPr id="5137" name="Text Box 20"/>
+          <p:cNvSpPr txBox="1">
+            <a:spLocks noChangeArrowheads="1"/>
+          </p:cNvSpPr>
+          <p:nvPr>
+            <p:custDataLst>
+              <p:tags r:id="rId15"/>
+            </p:custDataLst>
+          </p:nvPr>
+        </p:nvSpPr>
+        <p:spPr bwMode="auto">
+          <a:xfrm>
+            <a:off x="381000" y="4191000"/>
+            <a:ext cx="1225550" cy="366713"/>
+          </a:xfrm>
+          <a:prstGeom prst="rect">
+            <a:avLst/>
+          </a:prstGeom>
+          <a:noFill/>
+          <a:ln>
+            <a:noFill/>
+          </a:ln>
+          <a:extLst>
+            <a:ext uri="{909E8E84-426E-40dd-AFC4-6F175D3DCCD1}">
+              <a14:hiddenFill xmlns="" xmlns:a14="http://schemas.microsoft.com/office/drawing/2010/main">
+                <a:solidFill>
+                  <a:srgbClr val="FFFFFF"/>
+                </a:solidFill>
+              </a14:hiddenFill>
+            </a:ext>
+            <a:ext uri="{91240B29-F687-4f45-9708-019B960494DF}">
+              <a14:hiddenLine xmlns="" xmlns:a14="http://schemas.microsoft.com/office/drawing/2010/main" w="9525">
+                <a:solidFill>
+                  <a:srgbClr val="000000"/>
+                </a:solidFill>
+                <a:miter lim="800000"/>
+                <a:headEnd/>
+                <a:tailEnd/>
+              </a14:hiddenLine>
+            </a:ext>
+          </a:extLst>
+        </p:spPr>
+        <p:txBody>
+          <a:bodyPr wrap="none">
+            <a:spAutoFit/>
+          </a:bodyPr>
+          <a:lstStyle>
+            <a:lvl1pPr>
+              <a:defRPr>
+                <a:solidFill>
+                  <a:schemeClr val="tx1"/>
+                </a:solidFill>
+                <a:latin typeface="Tahoma" charset="0"/>
+              </a:defRPr>
+            </a:lvl1pPr>
+            <a:lvl2pPr marL="742950" indent="-285750">
+              <a:defRPr>
+                <a:solidFill>
+                  <a:schemeClr val="tx1"/>
+                </a:solidFill>
+                <a:latin typeface="Tahoma" charset="0"/>
+              </a:defRPr>
+            </a:lvl2pPr>
+            <a:lvl3pPr marL="1143000" indent="-228600">
+              <a:defRPr>
+                <a:solidFill>
+                  <a:schemeClr val="tx1"/>
+                </a:solidFill>
+                <a:latin typeface="Tahoma" charset="0"/>
+              </a:defRPr>
+            </a:lvl3pPr>
+            <a:lvl4pPr marL="1600200" indent="-228600">
+              <a:defRPr>
+                <a:solidFill>
+                  <a:schemeClr val="tx1"/>
+                </a:solidFill>
+                <a:latin typeface="Tahoma" charset="0"/>
+              </a:defRPr>
+            </a:lvl4pPr>
+            <a:lvl5pPr marL="2057400" indent="-228600">
+              <a:defRPr>
+                <a:solidFill>
+                  <a:schemeClr val="tx1"/>
+                </a:solidFill>
+                <a:latin typeface="Tahoma" charset="0"/>
+              </a:defRPr>
+            </a:lvl5pPr>
+            <a:lvl6pPr marL="2514600" indent="-228600" algn="ctr" eaLnBrk="0" fontAlgn="base" hangingPunct="0">
+              <a:spcBef>
+                <a:spcPct val="0"/>
+              </a:spcBef>
+              <a:spcAft>
+                <a:spcPct val="0"/>
+              </a:spcAft>
+              <a:defRPr>
+                <a:solidFill>
+                  <a:schemeClr val="tx1"/>
+                </a:solidFill>
+                <a:latin typeface="Tahoma" charset="0"/>
+              </a:defRPr>
+            </a:lvl6pPr>
+            <a:lvl7pPr marL="2971800" indent="-228600" algn="ctr" eaLnBrk="0" fontAlgn="base" hangingPunct="0">
+              <a:spcBef>
+                <a:spcPct val="0"/>
+              </a:spcBef>
+              <a:spcAft>
+                <a:spcPct val="0"/>
+              </a:spcAft>
+              <a:defRPr>
+                <a:solidFill>
+                  <a:schemeClr val="tx1"/>
+                </a:solidFill>
+                <a:latin typeface="Tahoma" charset="0"/>
+              </a:defRPr>
+            </a:lvl7pPr>
+            <a:lvl8pPr marL="3429000" indent="-228600" algn="ctr" eaLnBrk="0" fontAlgn="base" hangingPunct="0">
+              <a:spcBef>
+                <a:spcPct val="0"/>
+              </a:spcBef>
+              <a:spcAft>
+                <a:spcPct val="0"/>
+              </a:spcAft>
+              <a:defRPr>
+                <a:solidFill>
+                  <a:schemeClr val="tx1"/>
+                </a:solidFill>
+                <a:latin typeface="Tahoma" charset="0"/>
+              </a:defRPr>
+            </a:lvl8pPr>
+            <a:lvl9pPr marL="3886200" indent="-228600" algn="ctr" eaLnBrk="0" fontAlgn="base" hangingPunct="0">
+              <a:spcBef>
+                <a:spcPct val="0"/>
+              </a:spcBef>
+              <a:spcAft>
+                <a:spcPct val="0"/>
+              </a:spcAft>
+              <a:defRPr>
+                <a:solidFill>
+                  <a:schemeClr val="tx1"/>
+                </a:solidFill>
+                <a:latin typeface="Tahoma" charset="0"/>
+              </a:defRPr>
+            </a:lvl9pPr>
+          </a:lstStyle>
+          <a:p>
+            <a:pPr algn="l"/>
+            <a:r>
+              <a:rPr lang="en-US"/>
+              <a:t>characters</a:t>
+            </a:r>
+          </a:p>
+        </p:txBody>
+      </p:sp>
+      <p:sp>
+        <p:nvSpPr>
+          <p:cNvPr id="5138" name="Text Box 21"/>
+          <p:cNvSpPr txBox="1">
+            <a:spLocks noChangeArrowheads="1"/>
+          </p:cNvSpPr>
+          <p:nvPr>
+            <p:custDataLst>
+              <p:tags r:id="rId16"/>
+            </p:custDataLst>
+          </p:nvPr>
+        </p:nvSpPr>
+        <p:spPr bwMode="auto">
+          <a:xfrm>
+            <a:off x="762000" y="2927350"/>
+            <a:ext cx="847725" cy="366713"/>
+          </a:xfrm>
+          <a:prstGeom prst="rect">
+            <a:avLst/>
+          </a:prstGeom>
+          <a:noFill/>
+          <a:ln>
+            <a:noFill/>
+          </a:ln>
+          <a:extLst>
+            <a:ext uri="{909E8E84-426E-40dd-AFC4-6F175D3DCCD1}">
+              <a14:hiddenFill xmlns="" xmlns:a14="http://schemas.microsoft.com/office/drawing/2010/main">
+                <a:solidFill>
+                  <a:srgbClr val="FFFFFF"/>
+                </a:solidFill>
+              </a14:hiddenFill>
+            </a:ext>
+            <a:ext uri="{91240B29-F687-4f45-9708-019B960494DF}">
+              <a14:hiddenLine xmlns="" xmlns:a14="http://schemas.microsoft.com/office/drawing/2010/main" w="9525">
+                <a:solidFill>
+                  <a:srgbClr val="000000"/>
+                </a:solidFill>
+                <a:miter lim="800000"/>
+                <a:headEnd/>
+                <a:tailEnd/>
+              </a14:hiddenLine>
+            </a:ext>
+          </a:extLst>
+        </p:spPr>
+        <p:txBody>
+          <a:bodyPr wrap="none">
+            <a:spAutoFit/>
+          </a:bodyPr>
+          <a:lstStyle>
+            <a:lvl1pPr>
+              <a:defRPr>
+                <a:solidFill>
+                  <a:schemeClr val="tx1"/>
+                </a:solidFill>
+                <a:latin typeface="Tahoma" charset="0"/>
+              </a:defRPr>
+            </a:lvl1pPr>
+            <a:lvl2pPr marL="742950" indent="-285750">
+              <a:defRPr>
+                <a:solidFill>
+                  <a:schemeClr val="tx1"/>
+                </a:solidFill>
+                <a:latin typeface="Tahoma" charset="0"/>
+              </a:defRPr>
+            </a:lvl2pPr>
+            <a:lvl3pPr marL="1143000" indent="-228600">
+              <a:defRPr>
+                <a:solidFill>
+                  <a:schemeClr val="tx1"/>
+                </a:solidFill>
+                <a:latin typeface="Tahoma" charset="0"/>
+              </a:defRPr>
+            </a:lvl3pPr>
+            <a:lvl4pPr marL="1600200" indent="-228600">
+              <a:defRPr>
+                <a:solidFill>
+                  <a:schemeClr val="tx1"/>
+                </a:solidFill>
+                <a:latin typeface="Tahoma" charset="0"/>
+              </a:defRPr>
+            </a:lvl4pPr>
+            <a:lvl5pPr marL="2057400" indent="-228600">
+              <a:defRPr>
+                <a:solidFill>
+                  <a:schemeClr val="tx1"/>
+                </a:solidFill>
+                <a:latin typeface="Tahoma" charset="0"/>
+              </a:defRPr>
+            </a:lvl5pPr>
+            <a:lvl6pPr marL="2514600" indent="-228600" algn="ctr" eaLnBrk="0" fontAlgn="base" hangingPunct="0">
+              <a:spcBef>
+                <a:spcPct val="0"/>
+              </a:spcBef>
+              <a:spcAft>
+                <a:spcPct val="0"/>
+              </a:spcAft>
+              <a:defRPr>
+                <a:solidFill>
+                  <a:schemeClr val="tx1"/>
+                </a:solidFill>
+                <a:latin typeface="Tahoma" charset="0"/>
+              </a:defRPr>
+            </a:lvl6pPr>
+            <a:lvl7pPr marL="2971800" indent="-228600" algn="ctr" eaLnBrk="0" fontAlgn="base" hangingPunct="0">
+              <a:spcBef>
+                <a:spcPct val="0"/>
+              </a:spcBef>
+              <a:spcAft>
+                <a:spcPct val="0"/>
+              </a:spcAft>
+              <a:defRPr>
+                <a:solidFill>
+                  <a:schemeClr val="tx1"/>
+                </a:solidFill>
+                <a:latin typeface="Tahoma" charset="0"/>
+              </a:defRPr>
+            </a:lvl7pPr>
+            <a:lvl8pPr marL="3429000" indent="-228600" algn="ctr" eaLnBrk="0" fontAlgn="base" hangingPunct="0">
+              <a:spcBef>
+                <a:spcPct val="0"/>
+              </a:spcBef>
+              <a:spcAft>
+                <a:spcPct val="0"/>
+              </a:spcAft>
+              <a:defRPr>
+                <a:solidFill>
+                  <a:schemeClr val="tx1"/>
+                </a:solidFill>
+                <a:latin typeface="Tahoma" charset="0"/>
+              </a:defRPr>
+            </a:lvl8pPr>
+            <a:lvl9pPr marL="3886200" indent="-228600" algn="ctr" eaLnBrk="0" fontAlgn="base" hangingPunct="0">
+              <a:spcBef>
+                <a:spcPct val="0"/>
+              </a:spcBef>
+              <a:spcAft>
+                <a:spcPct val="0"/>
+              </a:spcAft>
+              <a:defRPr>
+                <a:solidFill>
+                  <a:schemeClr val="tx1"/>
+                </a:solidFill>
+                <a:latin typeface="Tahoma" charset="0"/>
+              </a:defRPr>
+            </a:lvl9pPr>
+          </a:lstStyle>
+          <a:p>
+            <a:pPr algn="l"/>
+            <a:r>
+              <a:rPr lang="en-US"/>
+              <a:t>tokens</a:t>
+            </a:r>
+          </a:p>
+        </p:txBody>
+      </p:sp>
+      <p:sp>
+        <p:nvSpPr>
+          <p:cNvPr id="5139" name="Text Box 22"/>
+          <p:cNvSpPr txBox="1">
+            <a:spLocks noChangeArrowheads="1"/>
+          </p:cNvSpPr>
+          <p:nvPr>
+            <p:custDataLst>
+              <p:tags r:id="rId17"/>
+            </p:custDataLst>
+          </p:nvPr>
+        </p:nvSpPr>
+        <p:spPr bwMode="auto">
+          <a:xfrm>
+            <a:off x="2636838" y="2133600"/>
+            <a:ext cx="411162" cy="366713"/>
+          </a:xfrm>
+          <a:prstGeom prst="rect">
+            <a:avLst/>
+          </a:prstGeom>
+          <a:noFill/>
+          <a:ln>
+            <a:noFill/>
+          </a:ln>
+          <a:extLst>
+            <a:ext uri="{909E8E84-426E-40dd-AFC4-6F175D3DCCD1}">
+              <a14:hiddenFill xmlns="" xmlns:a14="http://schemas.microsoft.com/office/drawing/2010/main">
+                <a:solidFill>
+                  <a:srgbClr val="FFFFFF"/>
+                </a:solidFill>
+              </a14:hiddenFill>
+            </a:ext>
+            <a:ext uri="{91240B29-F687-4f45-9708-019B960494DF}">
+              <a14:hiddenLine xmlns="" xmlns:a14="http://schemas.microsoft.com/office/drawing/2010/main" w="9525">
+                <a:solidFill>
+                  <a:srgbClr val="000000"/>
+                </a:solidFill>
+                <a:miter lim="800000"/>
+                <a:headEnd/>
+                <a:tailEnd/>
+              </a14:hiddenLine>
+            </a:ext>
+          </a:extLst>
+        </p:spPr>
+        <p:txBody>
+          <a:bodyPr wrap="none">
+            <a:spAutoFit/>
+          </a:bodyPr>
+          <a:lstStyle>
+            <a:lvl1pPr>
+              <a:defRPr>
+                <a:solidFill>
+                  <a:schemeClr val="tx1"/>
+                </a:solidFill>
+                <a:latin typeface="Tahoma" charset="0"/>
+              </a:defRPr>
+            </a:lvl1pPr>
+            <a:lvl2pPr marL="742950" indent="-285750">
+              <a:defRPr>
+                <a:solidFill>
+                  <a:schemeClr val="tx1"/>
+                </a:solidFill>
+                <a:latin typeface="Tahoma" charset="0"/>
+              </a:defRPr>
+            </a:lvl2pPr>
+            <a:lvl3pPr marL="1143000" indent="-228600">
+              <a:defRPr>
+                <a:solidFill>
+                  <a:schemeClr val="tx1"/>
+                </a:solidFill>
+                <a:latin typeface="Tahoma" charset="0"/>
+              </a:defRPr>
+            </a:lvl3pPr>
+            <a:lvl4pPr marL="1600200" indent="-228600">
+              <a:defRPr>
+                <a:solidFill>
+                  <a:schemeClr val="tx1"/>
+                </a:solidFill>
+                <a:latin typeface="Tahoma" charset="0"/>
+              </a:defRPr>
+            </a:lvl4pPr>
+            <a:lvl5pPr marL="2057400" indent="-228600">
+              <a:defRPr>
+                <a:solidFill>
+                  <a:schemeClr val="tx1"/>
+                </a:solidFill>
+                <a:latin typeface="Tahoma" charset="0"/>
+              </a:defRPr>
+            </a:lvl5pPr>
+            <a:lvl6pPr marL="2514600" indent="-228600" algn="ctr" eaLnBrk="0" fontAlgn="base" hangingPunct="0">
+              <a:spcBef>
+                <a:spcPct val="0"/>
+              </a:spcBef>
+              <a:spcAft>
+                <a:spcPct val="0"/>
+              </a:spcAft>
+              <a:defRPr>
+                <a:solidFill>
+                  <a:schemeClr val="tx1"/>
+                </a:solidFill>
+                <a:latin typeface="Tahoma" charset="0"/>
+              </a:defRPr>
+            </a:lvl6pPr>
+            <a:lvl7pPr marL="2971800" indent="-228600" algn="ctr" eaLnBrk="0" fontAlgn="base" hangingPunct="0">
+              <a:spcBef>
+                <a:spcPct val="0"/>
+              </a:spcBef>
+              <a:spcAft>
+                <a:spcPct val="0"/>
+              </a:spcAft>
+              <a:defRPr>
+                <a:solidFill>
+                  <a:schemeClr val="tx1"/>
+                </a:solidFill>
+                <a:latin typeface="Tahoma" charset="0"/>
+              </a:defRPr>
+            </a:lvl7pPr>
+            <a:lvl8pPr marL="3429000" indent="-228600" algn="ctr" eaLnBrk="0" fontAlgn="base" hangingPunct="0">
+              <a:spcBef>
+                <a:spcPct val="0"/>
+              </a:spcBef>
+              <a:spcAft>
+                <a:spcPct val="0"/>
+              </a:spcAft>
+              <a:defRPr>
+                <a:solidFill>
+                  <a:schemeClr val="tx1"/>
+                </a:solidFill>
+                <a:latin typeface="Tahoma" charset="0"/>
+              </a:defRPr>
+            </a:lvl8pPr>
+            <a:lvl9pPr marL="3886200" indent="-228600" algn="ctr" eaLnBrk="0" fontAlgn="base" hangingPunct="0">
+              <a:spcBef>
+                <a:spcPct val="0"/>
+              </a:spcBef>
+              <a:spcAft>
+                <a:spcPct val="0"/>
+              </a:spcAft>
+              <a:defRPr>
+                <a:solidFill>
+                  <a:schemeClr val="tx1"/>
+                </a:solidFill>
+                <a:latin typeface="Tahoma" charset="0"/>
+              </a:defRPr>
+            </a:lvl9pPr>
+          </a:lstStyle>
+          <a:p>
+            <a:pPr algn="l"/>
+            <a:r>
+              <a:rPr lang="en-US" dirty="0"/>
+              <a:t>IR</a:t>
+            </a:r>
+          </a:p>
+        </p:txBody>
+      </p:sp>
+      <p:sp>
+        <p:nvSpPr>
+          <p:cNvPr id="5140" name="Text Box 24"/>
+          <p:cNvSpPr txBox="1">
+            <a:spLocks noChangeArrowheads="1"/>
+          </p:cNvSpPr>
+          <p:nvPr>
+            <p:custDataLst>
+              <p:tags r:id="rId18"/>
+            </p:custDataLst>
+          </p:nvPr>
+        </p:nvSpPr>
+        <p:spPr bwMode="auto">
+          <a:xfrm>
+            <a:off x="6111875" y="2983468"/>
+            <a:ext cx="2116197" cy="369332"/>
+          </a:xfrm>
+          <a:prstGeom prst="rect">
+            <a:avLst/>
+          </a:prstGeom>
+          <a:noFill/>
+          <a:ln>
+            <a:noFill/>
+          </a:ln>
+          <a:extLst>
+            <a:ext uri="{909E8E84-426E-40dd-AFC4-6F175D3DCCD1}">
+              <a14:hiddenFill xmlns="" xmlns:a14="http://schemas.microsoft.com/office/drawing/2010/main">
+                <a:solidFill>
+                  <a:srgbClr val="FFFFFF"/>
+                </a:solidFill>
+              </a14:hiddenFill>
+            </a:ext>
+            <a:ext uri="{91240B29-F687-4f45-9708-019B960494DF}">
+              <a14:hiddenLine xmlns="" xmlns:a14="http://schemas.microsoft.com/office/drawing/2010/main" w="9525">
+                <a:solidFill>
+                  <a:srgbClr val="000000"/>
+                </a:solidFill>
+                <a:miter lim="800000"/>
+                <a:headEnd/>
+                <a:tailEnd/>
+              </a14:hiddenLine>
+            </a:ext>
+          </a:extLst>
+        </p:spPr>
+        <p:txBody>
+          <a:bodyPr wrap="none">
+            <a:spAutoFit/>
+          </a:bodyPr>
+          <a:lstStyle>
+            <a:lvl1pPr>
+              <a:defRPr>
+                <a:solidFill>
+                  <a:schemeClr val="tx1"/>
+                </a:solidFill>
+                <a:latin typeface="Tahoma" charset="0"/>
+              </a:defRPr>
+            </a:lvl1pPr>
+            <a:lvl2pPr marL="742950" indent="-285750">
+              <a:defRPr>
+                <a:solidFill>
+                  <a:schemeClr val="tx1"/>
+                </a:solidFill>
+                <a:latin typeface="Tahoma" charset="0"/>
+              </a:defRPr>
+            </a:lvl2pPr>
+            <a:lvl3pPr marL="1143000" indent="-228600">
+              <a:defRPr>
+                <a:solidFill>
+                  <a:schemeClr val="tx1"/>
+                </a:solidFill>
+                <a:latin typeface="Tahoma" charset="0"/>
+              </a:defRPr>
+            </a:lvl3pPr>
+            <a:lvl4pPr marL="1600200" indent="-228600">
+              <a:defRPr>
+                <a:solidFill>
+                  <a:schemeClr val="tx1"/>
+                </a:solidFill>
+                <a:latin typeface="Tahoma" charset="0"/>
+              </a:defRPr>
+            </a:lvl4pPr>
+            <a:lvl5pPr marL="2057400" indent="-228600">
+              <a:defRPr>
+                <a:solidFill>
+                  <a:schemeClr val="tx1"/>
+                </a:solidFill>
+                <a:latin typeface="Tahoma" charset="0"/>
+              </a:defRPr>
+            </a:lvl5pPr>
+            <a:lvl6pPr marL="2514600" indent="-228600" algn="ctr" eaLnBrk="0" fontAlgn="base" hangingPunct="0">
+              <a:spcBef>
+                <a:spcPct val="0"/>
+              </a:spcBef>
+              <a:spcAft>
+                <a:spcPct val="0"/>
+              </a:spcAft>
+              <a:defRPr>
+                <a:solidFill>
+                  <a:schemeClr val="tx1"/>
+                </a:solidFill>
+                <a:latin typeface="Tahoma" charset="0"/>
+              </a:defRPr>
+            </a:lvl6pPr>
+            <a:lvl7pPr marL="2971800" indent="-228600" algn="ctr" eaLnBrk="0" fontAlgn="base" hangingPunct="0">
+              <a:spcBef>
+                <a:spcPct val="0"/>
+              </a:spcBef>
+              <a:spcAft>
+                <a:spcPct val="0"/>
+              </a:spcAft>
+              <a:defRPr>
+                <a:solidFill>
+                  <a:schemeClr val="tx1"/>
+                </a:solidFill>
+                <a:latin typeface="Tahoma" charset="0"/>
+              </a:defRPr>
+            </a:lvl7pPr>
+            <a:lvl8pPr marL="3429000" indent="-228600" algn="ctr" eaLnBrk="0" fontAlgn="base" hangingPunct="0">
+              <a:spcBef>
+                <a:spcPct val="0"/>
+              </a:spcBef>
+              <a:spcAft>
+                <a:spcPct val="0"/>
+              </a:spcAft>
+              <a:defRPr>
+                <a:solidFill>
+                  <a:schemeClr val="tx1"/>
+                </a:solidFill>
+                <a:latin typeface="Tahoma" charset="0"/>
+              </a:defRPr>
+            </a:lvl8pPr>
+            <a:lvl9pPr marL="3886200" indent="-228600" algn="ctr" eaLnBrk="0" fontAlgn="base" hangingPunct="0">
+              <a:spcBef>
+                <a:spcPct val="0"/>
+              </a:spcBef>
+              <a:spcAft>
+                <a:spcPct val="0"/>
+              </a:spcAft>
+              <a:defRPr>
+                <a:solidFill>
+                  <a:schemeClr val="tx1"/>
+                </a:solidFill>
+                <a:latin typeface="Tahoma" charset="0"/>
+              </a:defRPr>
+            </a:lvl9pPr>
+          </a:lstStyle>
+          <a:p>
+            <a:pPr algn="l"/>
+            <a:r>
+              <a:rPr lang="en-US" dirty="0"/>
+              <a:t>IR (often different)</a:t>
+            </a:r>
+          </a:p>
+        </p:txBody>
+      </p:sp>
+      <p:sp>
+        <p:nvSpPr>
+          <p:cNvPr id="5141" name="Text Box 25"/>
+          <p:cNvSpPr txBox="1">
+            <a:spLocks noChangeArrowheads="1"/>
+          </p:cNvSpPr>
+          <p:nvPr>
+            <p:custDataLst>
+              <p:tags r:id="rId19"/>
+            </p:custDataLst>
+          </p:nvPr>
+        </p:nvSpPr>
+        <p:spPr bwMode="auto">
+          <a:xfrm>
+            <a:off x="6111875" y="4205288"/>
+            <a:ext cx="2651125" cy="366712"/>
+          </a:xfrm>
+          <a:prstGeom prst="rect">
+            <a:avLst/>
+          </a:prstGeom>
+          <a:noFill/>
+          <a:ln>
+            <a:noFill/>
+          </a:ln>
+          <a:extLst>
+            <a:ext uri="{909E8E84-426E-40dd-AFC4-6F175D3DCCD1}">
+              <a14:hiddenFill xmlns="" xmlns:a14="http://schemas.microsoft.com/office/drawing/2010/main">
+                <a:solidFill>
+                  <a:srgbClr val="FFFFFF"/>
+                </a:solidFill>
+              </a14:hiddenFill>
+            </a:ext>
+            <a:ext uri="{91240B29-F687-4f45-9708-019B960494DF}">
+              <a14:hiddenLine xmlns="" xmlns:a14="http://schemas.microsoft.com/office/drawing/2010/main" w="9525">
+                <a:solidFill>
+                  <a:srgbClr val="000000"/>
+                </a:solidFill>
+                <a:miter lim="800000"/>
+                <a:headEnd/>
+                <a:tailEnd/>
+              </a14:hiddenLine>
+            </a:ext>
+          </a:extLst>
+        </p:spPr>
+        <p:txBody>
+          <a:bodyPr wrap="none">
+            <a:spAutoFit/>
+          </a:bodyPr>
+          <a:lstStyle>
+            <a:lvl1pPr>
+              <a:defRPr>
+                <a:solidFill>
+                  <a:schemeClr val="tx1"/>
+                </a:solidFill>
+                <a:latin typeface="Tahoma" charset="0"/>
+              </a:defRPr>
+            </a:lvl1pPr>
+            <a:lvl2pPr marL="742950" indent="-285750">
+              <a:defRPr>
+                <a:solidFill>
+                  <a:schemeClr val="tx1"/>
+                </a:solidFill>
+                <a:latin typeface="Tahoma" charset="0"/>
+              </a:defRPr>
+            </a:lvl2pPr>
+            <a:lvl3pPr marL="1143000" indent="-228600">
+              <a:defRPr>
+                <a:solidFill>
+                  <a:schemeClr val="tx1"/>
+                </a:solidFill>
+                <a:latin typeface="Tahoma" charset="0"/>
+              </a:defRPr>
+            </a:lvl3pPr>
+            <a:lvl4pPr marL="1600200" indent="-228600">
+              <a:defRPr>
+                <a:solidFill>
+                  <a:schemeClr val="tx1"/>
+                </a:solidFill>
+                <a:latin typeface="Tahoma" charset="0"/>
+              </a:defRPr>
+            </a:lvl4pPr>
+            <a:lvl5pPr marL="2057400" indent="-228600">
+              <a:defRPr>
+                <a:solidFill>
+                  <a:schemeClr val="tx1"/>
+                </a:solidFill>
+                <a:latin typeface="Tahoma" charset="0"/>
+              </a:defRPr>
+            </a:lvl5pPr>
+            <a:lvl6pPr marL="2514600" indent="-228600" algn="ctr" eaLnBrk="0" fontAlgn="base" hangingPunct="0">
+              <a:spcBef>
+                <a:spcPct val="0"/>
+              </a:spcBef>
+              <a:spcAft>
+                <a:spcPct val="0"/>
+              </a:spcAft>
+              <a:defRPr>
+                <a:solidFill>
+                  <a:schemeClr val="tx1"/>
+                </a:solidFill>
+                <a:latin typeface="Tahoma" charset="0"/>
+              </a:defRPr>
+            </a:lvl6pPr>
+            <a:lvl7pPr marL="2971800" indent="-228600" algn="ctr" eaLnBrk="0" fontAlgn="base" hangingPunct="0">
+              <a:spcBef>
+                <a:spcPct val="0"/>
+              </a:spcBef>
+              <a:spcAft>
+                <a:spcPct val="0"/>
+              </a:spcAft>
+              <a:defRPr>
+                <a:solidFill>
+                  <a:schemeClr val="tx1"/>
+                </a:solidFill>
+                <a:latin typeface="Tahoma" charset="0"/>
+              </a:defRPr>
+            </a:lvl7pPr>
+            <a:lvl8pPr marL="3429000" indent="-228600" algn="ctr" eaLnBrk="0" fontAlgn="base" hangingPunct="0">
+              <a:spcBef>
+                <a:spcPct val="0"/>
+              </a:spcBef>
+              <a:spcAft>
+                <a:spcPct val="0"/>
+              </a:spcAft>
+              <a:defRPr>
+                <a:solidFill>
+                  <a:schemeClr val="tx1"/>
+                </a:solidFill>
+                <a:latin typeface="Tahoma" charset="0"/>
+              </a:defRPr>
+            </a:lvl8pPr>
+            <a:lvl9pPr marL="3886200" indent="-228600" algn="ctr" eaLnBrk="0" fontAlgn="base" hangingPunct="0">
+              <a:spcBef>
+                <a:spcPct val="0"/>
+              </a:spcBef>
+              <a:spcAft>
+                <a:spcPct val="0"/>
+              </a:spcAft>
+              <a:defRPr>
+                <a:solidFill>
+                  <a:schemeClr val="tx1"/>
+                </a:solidFill>
+                <a:latin typeface="Tahoma" charset="0"/>
+              </a:defRPr>
+            </a:lvl9pPr>
+          </a:lstStyle>
+          <a:p>
+            <a:pPr algn="l"/>
+            <a:r>
+              <a:rPr lang="en-US"/>
+              <a:t>Assembly or binary code</a:t>
+            </a:r>
+          </a:p>
+        </p:txBody>
+      </p:sp>
+      <p:sp>
+        <p:nvSpPr>
+          <p:cNvPr id="22" name="Rectangle 14"/>
+          <p:cNvSpPr>
+            <a:spLocks noChangeArrowheads="1"/>
+          </p:cNvSpPr>
+          <p:nvPr>
+            <p:custDataLst>
+              <p:tags r:id="rId20"/>
+            </p:custDataLst>
+          </p:nvPr>
+        </p:nvSpPr>
+        <p:spPr bwMode="auto">
+          <a:xfrm>
+            <a:off x="3276600" y="2209800"/>
+            <a:ext cx="1295400" cy="685800"/>
+          </a:xfrm>
+          <a:prstGeom prst="rect">
+            <a:avLst/>
+          </a:prstGeom>
+          <a:solidFill>
+            <a:schemeClr val="accent1"/>
+          </a:solidFill>
+          <a:ln w="9525">
+            <a:solidFill>
+              <a:schemeClr val="tx1"/>
+            </a:solidFill>
+            <a:miter lim="800000"/>
+            <a:headEnd/>
+            <a:tailEnd/>
+          </a:ln>
+        </p:spPr>
+        <p:txBody>
+          <a:bodyPr wrap="none" anchor="ctr"/>
+          <a:lstStyle/>
+          <a:p>
+            <a:r>
+              <a:rPr lang="en-US" dirty="0"/>
+              <a:t>Semantic</a:t>
+            </a:r>
+          </a:p>
+          <a:p>
+            <a:r>
+              <a:rPr lang="en-US" dirty="0"/>
+              <a:t>Analysis</a:t>
+            </a:r>
+          </a:p>
+        </p:txBody>
+      </p:sp>
+      <p:sp>
+        <p:nvSpPr>
+          <p:cNvPr id="23" name="Line 19"/>
+          <p:cNvSpPr>
+            <a:spLocks noChangeShapeType="1"/>
+          </p:cNvSpPr>
+          <p:nvPr>
+            <p:custDataLst>
+              <p:tags r:id="rId21"/>
+            </p:custDataLst>
+          </p:nvPr>
+        </p:nvSpPr>
+        <p:spPr bwMode="auto">
+          <a:xfrm flipV="1">
+            <a:off x="4572000" y="2590800"/>
+            <a:ext cx="914400" cy="0"/>
+          </a:xfrm>
+          <a:prstGeom prst="line">
+            <a:avLst/>
+          </a:prstGeom>
+          <a:noFill/>
+          <a:ln w="57150">
+            <a:solidFill>
+              <a:schemeClr val="tx2"/>
+            </a:solidFill>
+            <a:round/>
+            <a:headEnd/>
+            <a:tailEnd type="triangle" w="med" len="med"/>
+          </a:ln>
+          <a:extLst>
+            <a:ext uri="{909E8E84-426E-40dd-AFC4-6F175D3DCCD1}">
+              <a14:hiddenFill xmlns="" xmlns:a14="http://schemas.microsoft.com/office/drawing/2010/main">
+                <a:noFill/>
+              </a14:hiddenFill>
+            </a:ext>
+          </a:extLst>
+        </p:spPr>
+        <p:txBody>
+          <a:bodyPr/>
+          <a:lstStyle/>
+          <a:p>
+            <a:endParaRPr lang="en-US"/>
+          </a:p>
+        </p:txBody>
+      </p:sp>
+      <p:sp>
+        <p:nvSpPr>
+          <p:cNvPr id="24" name="Text Box 24"/>
+          <p:cNvSpPr txBox="1">
+            <a:spLocks noChangeArrowheads="1"/>
+          </p:cNvSpPr>
+          <p:nvPr>
+            <p:custDataLst>
+              <p:tags r:id="rId22"/>
+            </p:custDataLst>
+          </p:nvPr>
+        </p:nvSpPr>
+        <p:spPr bwMode="auto">
+          <a:xfrm>
+            <a:off x="4510854" y="2590800"/>
+            <a:ext cx="1127946" cy="646331"/>
+          </a:xfrm>
+          <a:prstGeom prst="rect">
+            <a:avLst/>
+          </a:prstGeom>
+          <a:noFill/>
+          <a:ln>
+            <a:noFill/>
+          </a:ln>
+          <a:extLst>
+            <a:ext uri="{909E8E84-426E-40dd-AFC4-6F175D3DCCD1}">
+              <a14:hiddenFill xmlns="" xmlns:a14="http://schemas.microsoft.com/office/drawing/2010/main">
+                <a:solidFill>
+                  <a:srgbClr val="FFFFFF"/>
+                </a:solidFill>
+              </a14:hiddenFill>
+            </a:ext>
+            <a:ext uri="{91240B29-F687-4f45-9708-019B960494DF}">
+              <a14:hiddenLine xmlns="" xmlns:a14="http://schemas.microsoft.com/office/drawing/2010/main" w="9525">
+                <a:solidFill>
+                  <a:srgbClr val="000000"/>
+                </a:solidFill>
+                <a:miter lim="800000"/>
+                <a:headEnd/>
+                <a:tailEnd/>
+              </a14:hiddenLine>
+            </a:ext>
+          </a:extLst>
+        </p:spPr>
+        <p:txBody>
+          <a:bodyPr wrap="none">
+            <a:spAutoFit/>
+          </a:bodyPr>
+          <a:lstStyle>
+            <a:lvl1pPr>
+              <a:defRPr>
+                <a:solidFill>
+                  <a:schemeClr val="tx1"/>
+                </a:solidFill>
+                <a:latin typeface="Tahoma" charset="0"/>
+              </a:defRPr>
+            </a:lvl1pPr>
+            <a:lvl2pPr marL="742950" indent="-285750">
+              <a:defRPr>
+                <a:solidFill>
+                  <a:schemeClr val="tx1"/>
+                </a:solidFill>
+                <a:latin typeface="Tahoma" charset="0"/>
+              </a:defRPr>
+            </a:lvl2pPr>
+            <a:lvl3pPr marL="1143000" indent="-228600">
+              <a:defRPr>
+                <a:solidFill>
+                  <a:schemeClr val="tx1"/>
+                </a:solidFill>
+                <a:latin typeface="Tahoma" charset="0"/>
+              </a:defRPr>
+            </a:lvl3pPr>
+            <a:lvl4pPr marL="1600200" indent="-228600">
+              <a:defRPr>
+                <a:solidFill>
+                  <a:schemeClr val="tx1"/>
+                </a:solidFill>
+                <a:latin typeface="Tahoma" charset="0"/>
+              </a:defRPr>
+            </a:lvl4pPr>
+            <a:lvl5pPr marL="2057400" indent="-228600">
+              <a:defRPr>
+                <a:solidFill>
+                  <a:schemeClr val="tx1"/>
+                </a:solidFill>
+                <a:latin typeface="Tahoma" charset="0"/>
+              </a:defRPr>
+            </a:lvl5pPr>
+            <a:lvl6pPr marL="2514600" indent="-228600" algn="ctr" eaLnBrk="0" fontAlgn="base" hangingPunct="0">
+              <a:spcBef>
+                <a:spcPct val="0"/>
+              </a:spcBef>
+              <a:spcAft>
+                <a:spcPct val="0"/>
+              </a:spcAft>
+              <a:defRPr>
+                <a:solidFill>
+                  <a:schemeClr val="tx1"/>
+                </a:solidFill>
+                <a:latin typeface="Tahoma" charset="0"/>
+              </a:defRPr>
+            </a:lvl6pPr>
+            <a:lvl7pPr marL="2971800" indent="-228600" algn="ctr" eaLnBrk="0" fontAlgn="base" hangingPunct="0">
+              <a:spcBef>
+                <a:spcPct val="0"/>
+              </a:spcBef>
+              <a:spcAft>
+                <a:spcPct val="0"/>
+              </a:spcAft>
+              <a:defRPr>
+                <a:solidFill>
+                  <a:schemeClr val="tx1"/>
+                </a:solidFill>
+                <a:latin typeface="Tahoma" charset="0"/>
+              </a:defRPr>
+            </a:lvl7pPr>
+            <a:lvl8pPr marL="3429000" indent="-228600" algn="ctr" eaLnBrk="0" fontAlgn="base" hangingPunct="0">
+              <a:spcBef>
+                <a:spcPct val="0"/>
+              </a:spcBef>
+              <a:spcAft>
+                <a:spcPct val="0"/>
+              </a:spcAft>
+              <a:defRPr>
+                <a:solidFill>
+                  <a:schemeClr val="tx1"/>
+                </a:solidFill>
+                <a:latin typeface="Tahoma" charset="0"/>
+              </a:defRPr>
+            </a:lvl8pPr>
+            <a:lvl9pPr marL="3886200" indent="-228600" algn="ctr" eaLnBrk="0" fontAlgn="base" hangingPunct="0">
+              <a:spcBef>
+                <a:spcPct val="0"/>
+              </a:spcBef>
+              <a:spcAft>
+                <a:spcPct val="0"/>
+              </a:spcAft>
+              <a:defRPr>
+                <a:solidFill>
+                  <a:schemeClr val="tx1"/>
+                </a:solidFill>
+                <a:latin typeface="Tahoma" charset="0"/>
+              </a:defRPr>
+            </a:lvl9pPr>
+          </a:lstStyle>
+          <a:p>
+            <a:pPr algn="l"/>
+            <a:r>
+              <a:rPr lang="en-US" dirty="0"/>
+              <a:t>(maybe</a:t>
+            </a:r>
+          </a:p>
+          <a:p>
+            <a:pPr algn="l"/>
+            <a:r>
+              <a:rPr lang="en-US" dirty="0"/>
+              <a:t>different)</a:t>
+            </a:r>
+          </a:p>
+        </p:txBody>
+      </p:sp>
+      <p:sp>
+        <p:nvSpPr>
+          <p:cNvPr id="25" name="Text Box 22"/>
+          <p:cNvSpPr txBox="1">
+            <a:spLocks noChangeArrowheads="1"/>
+          </p:cNvSpPr>
+          <p:nvPr>
+            <p:custDataLst>
+              <p:tags r:id="rId23"/>
+            </p:custDataLst>
+          </p:nvPr>
+        </p:nvSpPr>
+        <p:spPr bwMode="auto">
+          <a:xfrm>
+            <a:off x="4770438" y="2133600"/>
+            <a:ext cx="411162" cy="366713"/>
+          </a:xfrm>
+          <a:prstGeom prst="rect">
+            <a:avLst/>
+          </a:prstGeom>
+          <a:noFill/>
+          <a:ln>
+            <a:noFill/>
+          </a:ln>
+          <a:extLst>
+            <a:ext uri="{909E8E84-426E-40dd-AFC4-6F175D3DCCD1}">
+              <a14:hiddenFill xmlns="" xmlns:a14="http://schemas.microsoft.com/office/drawing/2010/main">
+                <a:solidFill>
+                  <a:srgbClr val="FFFFFF"/>
+                </a:solidFill>
+              </a14:hiddenFill>
+            </a:ext>
+            <a:ext uri="{91240B29-F687-4f45-9708-019B960494DF}">
+              <a14:hiddenLine xmlns="" xmlns:a14="http://schemas.microsoft.com/office/drawing/2010/main" w="9525">
+                <a:solidFill>
+                  <a:srgbClr val="000000"/>
+                </a:solidFill>
+                <a:miter lim="800000"/>
+                <a:headEnd/>
+                <a:tailEnd/>
+              </a14:hiddenLine>
+            </a:ext>
+          </a:extLst>
+        </p:spPr>
+        <p:txBody>
+          <a:bodyPr wrap="none">
+            <a:spAutoFit/>
+          </a:bodyPr>
+          <a:lstStyle>
+            <a:lvl1pPr>
+              <a:defRPr>
+                <a:solidFill>
+                  <a:schemeClr val="tx1"/>
+                </a:solidFill>
+                <a:latin typeface="Tahoma" charset="0"/>
+              </a:defRPr>
+            </a:lvl1pPr>
+            <a:lvl2pPr marL="742950" indent="-285750">
+              <a:defRPr>
+                <a:solidFill>
+                  <a:schemeClr val="tx1"/>
+                </a:solidFill>
+                <a:latin typeface="Tahoma" charset="0"/>
+              </a:defRPr>
+            </a:lvl2pPr>
+            <a:lvl3pPr marL="1143000" indent="-228600">
+              <a:defRPr>
+                <a:solidFill>
+                  <a:schemeClr val="tx1"/>
+                </a:solidFill>
+                <a:latin typeface="Tahoma" charset="0"/>
+              </a:defRPr>
+            </a:lvl3pPr>
+            <a:lvl4pPr marL="1600200" indent="-228600">
+              <a:defRPr>
+                <a:solidFill>
+                  <a:schemeClr val="tx1"/>
+                </a:solidFill>
+                <a:latin typeface="Tahoma" charset="0"/>
+              </a:defRPr>
+            </a:lvl4pPr>
+            <a:lvl5pPr marL="2057400" indent="-228600">
+              <a:defRPr>
+                <a:solidFill>
+                  <a:schemeClr val="tx1"/>
+                </a:solidFill>
+                <a:latin typeface="Tahoma" charset="0"/>
+              </a:defRPr>
+            </a:lvl5pPr>
+            <a:lvl6pPr marL="2514600" indent="-228600" algn="ctr" eaLnBrk="0" fontAlgn="base" hangingPunct="0">
+              <a:spcBef>
+                <a:spcPct val="0"/>
+              </a:spcBef>
+              <a:spcAft>
+                <a:spcPct val="0"/>
+              </a:spcAft>
+              <a:defRPr>
+                <a:solidFill>
+                  <a:schemeClr val="tx1"/>
+                </a:solidFill>
+                <a:latin typeface="Tahoma" charset="0"/>
+              </a:defRPr>
+            </a:lvl6pPr>
+            <a:lvl7pPr marL="2971800" indent="-228600" algn="ctr" eaLnBrk="0" fontAlgn="base" hangingPunct="0">
+              <a:spcBef>
+                <a:spcPct val="0"/>
+              </a:spcBef>
+              <a:spcAft>
+                <a:spcPct val="0"/>
+              </a:spcAft>
+              <a:defRPr>
+                <a:solidFill>
+                  <a:schemeClr val="tx1"/>
+                </a:solidFill>
+                <a:latin typeface="Tahoma" charset="0"/>
+              </a:defRPr>
+            </a:lvl7pPr>
+            <a:lvl8pPr marL="3429000" indent="-228600" algn="ctr" eaLnBrk="0" fontAlgn="base" hangingPunct="0">
+              <a:spcBef>
+                <a:spcPct val="0"/>
+              </a:spcBef>
+              <a:spcAft>
+                <a:spcPct val="0"/>
+              </a:spcAft>
+              <a:defRPr>
+                <a:solidFill>
+                  <a:schemeClr val="tx1"/>
+                </a:solidFill>
+                <a:latin typeface="Tahoma" charset="0"/>
+              </a:defRPr>
+            </a:lvl8pPr>
+            <a:lvl9pPr marL="3886200" indent="-228600" algn="ctr" eaLnBrk="0" fontAlgn="base" hangingPunct="0">
+              <a:spcBef>
+                <a:spcPct val="0"/>
+              </a:spcBef>
+              <a:spcAft>
+                <a:spcPct val="0"/>
+              </a:spcAft>
+              <a:defRPr>
+                <a:solidFill>
+                  <a:schemeClr val="tx1"/>
+                </a:solidFill>
+                <a:latin typeface="Tahoma" charset="0"/>
+              </a:defRPr>
+            </a:lvl9pPr>
+          </a:lstStyle>
+          <a:p>
+            <a:pPr algn="l"/>
+            <a:r>
+              <a:rPr lang="en-US" dirty="0"/>
+              <a:t>IR</a:t>
+            </a:r>
+          </a:p>
+        </p:txBody>
+      </p:sp>
+    </p:spTree>
+    <p:extLst>
+      <p:ext uri="{BB962C8B-B14F-4D97-AF65-F5344CB8AC3E}">
+        <p14:creationId xmlns:p14="http://schemas.microsoft.com/office/powerpoint/2010/main" val="2329439746"/>
+      </p:ext>
+    </p:extLst>
   </p:cSld>
   <p:clrMapOvr>
     <a:masterClrMapping/>
@@ -23851,14 +25846,14 @@
           <a:ln/>
           <a:extLst>
             <a:ext uri="{909E8E84-426E-40dd-AFC4-6F175D3DCCD1}">
-              <a14:hiddenFill xmlns:a14="http://schemas.microsoft.com/office/drawing/2010/main" xmlns="">
+              <a14:hiddenFill xmlns="" xmlns:a14="http://schemas.microsoft.com/office/drawing/2010/main">
                 <a:solidFill>
                   <a:srgbClr val="FFFFFF"/>
                 </a:solidFill>
               </a14:hiddenFill>
             </a:ext>
             <a:ext uri="{91240B29-F687-4f45-9708-019B960494DF}">
-              <a14:hiddenLine xmlns:a14="http://schemas.microsoft.com/office/drawing/2010/main" xmlns="" w="9525">
+              <a14:hiddenLine xmlns="" xmlns:a14="http://schemas.microsoft.com/office/drawing/2010/main" w="9525">
                 <a:solidFill>
                   <a:srgbClr val="000000"/>
                 </a:solidFill>
@@ -23996,14 +25991,14 @@
           <a:ln/>
           <a:extLst>
             <a:ext uri="{909E8E84-426E-40dd-AFC4-6F175D3DCCD1}">
-              <a14:hiddenFill xmlns:a14="http://schemas.microsoft.com/office/drawing/2010/main" xmlns="">
+              <a14:hiddenFill xmlns="" xmlns:a14="http://schemas.microsoft.com/office/drawing/2010/main">
                 <a:solidFill>
                   <a:srgbClr val="FFFFFF"/>
                 </a:solidFill>
               </a14:hiddenFill>
             </a:ext>
             <a:ext uri="{91240B29-F687-4f45-9708-019B960494DF}">
-              <a14:hiddenLine xmlns:a14="http://schemas.microsoft.com/office/drawing/2010/main" xmlns="" w="9525">
+              <a14:hiddenLine xmlns="" xmlns:a14="http://schemas.microsoft.com/office/drawing/2010/main" w="9525">
                 <a:solidFill>
                   <a:srgbClr val="000000"/>
                 </a:solidFill>
@@ -24161,7 +26156,7 @@
           </a:ln>
           <a:extLst>
             <a:ext uri="{909E8E84-426E-40dd-AFC4-6F175D3DCCD1}">
-              <a14:hiddenFill xmlns:a14="http://schemas.microsoft.com/office/drawing/2010/main" xmlns="">
+              <a14:hiddenFill xmlns="" xmlns:a14="http://schemas.microsoft.com/office/drawing/2010/main">
                 <a:solidFill>
                   <a:srgbClr val="FFFFFF"/>
                 </a:solidFill>
@@ -24211,7 +26206,7 @@
           </a:ln>
           <a:extLst>
             <a:ext uri="{909E8E84-426E-40dd-AFC4-6F175D3DCCD1}">
-              <a14:hiddenFill xmlns:a14="http://schemas.microsoft.com/office/drawing/2010/main" xmlns="">
+              <a14:hiddenFill xmlns="" xmlns:a14="http://schemas.microsoft.com/office/drawing/2010/main">
                 <a:solidFill>
                   <a:srgbClr val="FFFFFF"/>
                 </a:solidFill>
@@ -24261,7 +26256,7 @@
           </a:ln>
           <a:extLst>
             <a:ext uri="{909E8E84-426E-40dd-AFC4-6F175D3DCCD1}">
-              <a14:hiddenFill xmlns:a14="http://schemas.microsoft.com/office/drawing/2010/main" xmlns="">
+              <a14:hiddenFill xmlns="" xmlns:a14="http://schemas.microsoft.com/office/drawing/2010/main">
                 <a:solidFill>
                   <a:srgbClr val="FFFFFF"/>
                 </a:solidFill>
@@ -24311,7 +26306,7 @@
           </a:ln>
           <a:extLst>
             <a:ext uri="{909E8E84-426E-40dd-AFC4-6F175D3DCCD1}">
-              <a14:hiddenFill xmlns:a14="http://schemas.microsoft.com/office/drawing/2010/main" xmlns="">
+              <a14:hiddenFill xmlns="" xmlns:a14="http://schemas.microsoft.com/office/drawing/2010/main">
                 <a:solidFill>
                   <a:srgbClr val="FFFFFF"/>
                 </a:solidFill>
@@ -24361,7 +26356,7 @@
           </a:ln>
           <a:extLst>
             <a:ext uri="{909E8E84-426E-40dd-AFC4-6F175D3DCCD1}">
-              <a14:hiddenFill xmlns:a14="http://schemas.microsoft.com/office/drawing/2010/main" xmlns="">
+              <a14:hiddenFill xmlns="" xmlns:a14="http://schemas.microsoft.com/office/drawing/2010/main">
                 <a:noFill/>
               </a14:hiddenFill>
             </a:ext>
@@ -24406,7 +26401,7 @@
           </a:ln>
           <a:extLst>
             <a:ext uri="{909E8E84-426E-40dd-AFC4-6F175D3DCCD1}">
-              <a14:hiddenFill xmlns:a14="http://schemas.microsoft.com/office/drawing/2010/main" xmlns="">
+              <a14:hiddenFill xmlns="" xmlns:a14="http://schemas.microsoft.com/office/drawing/2010/main">
                 <a:noFill/>
               </a14:hiddenFill>
             </a:ext>
@@ -24451,7 +26446,7 @@
           </a:ln>
           <a:extLst>
             <a:ext uri="{909E8E84-426E-40dd-AFC4-6F175D3DCCD1}">
-              <a14:hiddenFill xmlns:a14="http://schemas.microsoft.com/office/drawing/2010/main" xmlns="">
+              <a14:hiddenFill xmlns="" xmlns:a14="http://schemas.microsoft.com/office/drawing/2010/main">
                 <a:noFill/>
               </a14:hiddenFill>
             </a:ext>
@@ -24926,13 +26921,151 @@
 </p:tagLst>
 </file>
 
+<file path=ppt/tags/tag112.xml><?xml version="1.0" encoding="utf-8"?>
+<p:tagLst xmlns:a="http://schemas.openxmlformats.org/drawingml/2006/main" xmlns:r="http://schemas.openxmlformats.org/officeDocument/2006/relationships" xmlns:p="http://schemas.openxmlformats.org/presentationml/2006/main">
+  <p:tag name="_INSTRUCTOR VIEW19C14C36-AC8E-43BC-9DB6-C2AAF774C7DC|PANE__TAG" val="_"/>
+</p:tagLst>
+</file>
+
+<file path=ppt/tags/tag113.xml><?xml version="1.0" encoding="utf-8"?>
+<p:tagLst xmlns:a="http://schemas.openxmlformats.org/drawingml/2006/main" xmlns:r="http://schemas.openxmlformats.org/officeDocument/2006/relationships" xmlns:p="http://schemas.openxmlformats.org/presentationml/2006/main">
+  <p:tag name="_INSTRUCTOR VIEW19C14C36-AC8E-43BC-9DB6-C2AAF774C7DC|PANE__TAG" val="_"/>
+</p:tagLst>
+</file>
+
+<file path=ppt/tags/tag114.xml><?xml version="1.0" encoding="utf-8"?>
+<p:tagLst xmlns:a="http://schemas.openxmlformats.org/drawingml/2006/main" xmlns:r="http://schemas.openxmlformats.org/officeDocument/2006/relationships" xmlns:p="http://schemas.openxmlformats.org/presentationml/2006/main">
+  <p:tag name="_INSTRUCTOR VIEW19C14C36-AC8E-43BC-9DB6-C2AAF774C7DC|PANE__TAG" val="_"/>
+</p:tagLst>
+</file>
+
+<file path=ppt/tags/tag115.xml><?xml version="1.0" encoding="utf-8"?>
+<p:tagLst xmlns:a="http://schemas.openxmlformats.org/drawingml/2006/main" xmlns:r="http://schemas.openxmlformats.org/officeDocument/2006/relationships" xmlns:p="http://schemas.openxmlformats.org/presentationml/2006/main">
+  <p:tag name="_INSTRUCTOR VIEW19C14C36-AC8E-43BC-9DB6-C2AAF774C7DC|PANE__TAG" val="_"/>
+</p:tagLst>
+</file>
+
+<file path=ppt/tags/tag116.xml><?xml version="1.0" encoding="utf-8"?>
+<p:tagLst xmlns:a="http://schemas.openxmlformats.org/drawingml/2006/main" xmlns:r="http://schemas.openxmlformats.org/officeDocument/2006/relationships" xmlns:p="http://schemas.openxmlformats.org/presentationml/2006/main">
+  <p:tag name="_INSTRUCTOR VIEW19C14C36-AC8E-43BC-9DB6-C2AAF774C7DC|PANE__TAG" val="_"/>
+</p:tagLst>
+</file>
+
+<file path=ppt/tags/tag117.xml><?xml version="1.0" encoding="utf-8"?>
+<p:tagLst xmlns:a="http://schemas.openxmlformats.org/drawingml/2006/main" xmlns:r="http://schemas.openxmlformats.org/officeDocument/2006/relationships" xmlns:p="http://schemas.openxmlformats.org/presentationml/2006/main">
+  <p:tag name="_INSTRUCTOR VIEW19C14C36-AC8E-43BC-9DB6-C2AAF774C7DC|PANE__TAG" val="_"/>
+</p:tagLst>
+</file>
+
+<file path=ppt/tags/tag118.xml><?xml version="1.0" encoding="utf-8"?>
+<p:tagLst xmlns:a="http://schemas.openxmlformats.org/drawingml/2006/main" xmlns:r="http://schemas.openxmlformats.org/officeDocument/2006/relationships" xmlns:p="http://schemas.openxmlformats.org/presentationml/2006/main">
+  <p:tag name="_INSTRUCTOR VIEW19C14C36-AC8E-43BC-9DB6-C2AAF774C7DC|PANE__TAG" val="_"/>
+</p:tagLst>
+</file>
+
+<file path=ppt/tags/tag119.xml><?xml version="1.0" encoding="utf-8"?>
+<p:tagLst xmlns:a="http://schemas.openxmlformats.org/drawingml/2006/main" xmlns:r="http://schemas.openxmlformats.org/officeDocument/2006/relationships" xmlns:p="http://schemas.openxmlformats.org/presentationml/2006/main">
+  <p:tag name="_INSTRUCTOR VIEW19C14C36-AC8E-43BC-9DB6-C2AAF774C7DC|PANE__TAG" val="_"/>
+</p:tagLst>
+</file>
+
 <file path=ppt/tags/tag12.xml><?xml version="1.0" encoding="utf-8"?>
 <p:tagLst xmlns:a="http://schemas.openxmlformats.org/drawingml/2006/main" xmlns:r="http://schemas.openxmlformats.org/officeDocument/2006/relationships" xmlns:p="http://schemas.openxmlformats.org/presentationml/2006/main">
   <p:tag name="_INSTRUCTOR VIEW19C14C36-AC8E-43BC-9DB6-C2AAF774C7DC|PANE__TAG" val="_"/>
 </p:tagLst>
 </file>
 
+<file path=ppt/tags/tag120.xml><?xml version="1.0" encoding="utf-8"?>
+<p:tagLst xmlns:a="http://schemas.openxmlformats.org/drawingml/2006/main" xmlns:r="http://schemas.openxmlformats.org/officeDocument/2006/relationships" xmlns:p="http://schemas.openxmlformats.org/presentationml/2006/main">
+  <p:tag name="_INSTRUCTOR VIEW19C14C36-AC8E-43BC-9DB6-C2AAF774C7DC|PANE__TAG" val="_"/>
+</p:tagLst>
+</file>
+
+<file path=ppt/tags/tag121.xml><?xml version="1.0" encoding="utf-8"?>
+<p:tagLst xmlns:a="http://schemas.openxmlformats.org/drawingml/2006/main" xmlns:r="http://schemas.openxmlformats.org/officeDocument/2006/relationships" xmlns:p="http://schemas.openxmlformats.org/presentationml/2006/main">
+  <p:tag name="_INSTRUCTOR VIEW19C14C36-AC8E-43BC-9DB6-C2AAF774C7DC|PANE__TAG" val="_"/>
+</p:tagLst>
+</file>
+
+<file path=ppt/tags/tag122.xml><?xml version="1.0" encoding="utf-8"?>
+<p:tagLst xmlns:a="http://schemas.openxmlformats.org/drawingml/2006/main" xmlns:r="http://schemas.openxmlformats.org/officeDocument/2006/relationships" xmlns:p="http://schemas.openxmlformats.org/presentationml/2006/main">
+  <p:tag name="_INSTRUCTOR VIEW19C14C36-AC8E-43BC-9DB6-C2AAF774C7DC|PANE__TAG" val="_"/>
+</p:tagLst>
+</file>
+
+<file path=ppt/tags/tag123.xml><?xml version="1.0" encoding="utf-8"?>
+<p:tagLst xmlns:a="http://schemas.openxmlformats.org/drawingml/2006/main" xmlns:r="http://schemas.openxmlformats.org/officeDocument/2006/relationships" xmlns:p="http://schemas.openxmlformats.org/presentationml/2006/main">
+  <p:tag name="_INSTRUCTOR VIEW19C14C36-AC8E-43BC-9DB6-C2AAF774C7DC|PANE__TAG" val="_"/>
+</p:tagLst>
+</file>
+
+<file path=ppt/tags/tag124.xml><?xml version="1.0" encoding="utf-8"?>
+<p:tagLst xmlns:a="http://schemas.openxmlformats.org/drawingml/2006/main" xmlns:r="http://schemas.openxmlformats.org/officeDocument/2006/relationships" xmlns:p="http://schemas.openxmlformats.org/presentationml/2006/main">
+  <p:tag name="_INSTRUCTOR VIEW19C14C36-AC8E-43BC-9DB6-C2AAF774C7DC|PANE__TAG" val="_"/>
+</p:tagLst>
+</file>
+
+<file path=ppt/tags/tag125.xml><?xml version="1.0" encoding="utf-8"?>
+<p:tagLst xmlns:a="http://schemas.openxmlformats.org/drawingml/2006/main" xmlns:r="http://schemas.openxmlformats.org/officeDocument/2006/relationships" xmlns:p="http://schemas.openxmlformats.org/presentationml/2006/main">
+  <p:tag name="_INSTRUCTOR VIEW19C14C36-AC8E-43BC-9DB6-C2AAF774C7DC|PANE__TAG" val="_"/>
+</p:tagLst>
+</file>
+
+<file path=ppt/tags/tag126.xml><?xml version="1.0" encoding="utf-8"?>
+<p:tagLst xmlns:a="http://schemas.openxmlformats.org/drawingml/2006/main" xmlns:r="http://schemas.openxmlformats.org/officeDocument/2006/relationships" xmlns:p="http://schemas.openxmlformats.org/presentationml/2006/main">
+  <p:tag name="_INSTRUCTOR VIEW19C14C36-AC8E-43BC-9DB6-C2AAF774C7DC|PANE__TAG" val="_"/>
+</p:tagLst>
+</file>
+
+<file path=ppt/tags/tag127.xml><?xml version="1.0" encoding="utf-8"?>
+<p:tagLst xmlns:a="http://schemas.openxmlformats.org/drawingml/2006/main" xmlns:r="http://schemas.openxmlformats.org/officeDocument/2006/relationships" xmlns:p="http://schemas.openxmlformats.org/presentationml/2006/main">
+  <p:tag name="_INSTRUCTOR VIEW19C14C36-AC8E-43BC-9DB6-C2AAF774C7DC|PANE__TAG" val="_"/>
+</p:tagLst>
+</file>
+
+<file path=ppt/tags/tag128.xml><?xml version="1.0" encoding="utf-8"?>
+<p:tagLst xmlns:a="http://schemas.openxmlformats.org/drawingml/2006/main" xmlns:r="http://schemas.openxmlformats.org/officeDocument/2006/relationships" xmlns:p="http://schemas.openxmlformats.org/presentationml/2006/main">
+  <p:tag name="_INSTRUCTOR VIEW19C14C36-AC8E-43BC-9DB6-C2AAF774C7DC|PANE__TAG" val="_"/>
+</p:tagLst>
+</file>
+
+<file path=ppt/tags/tag129.xml><?xml version="1.0" encoding="utf-8"?>
+<p:tagLst xmlns:a="http://schemas.openxmlformats.org/drawingml/2006/main" xmlns:r="http://schemas.openxmlformats.org/officeDocument/2006/relationships" xmlns:p="http://schemas.openxmlformats.org/presentationml/2006/main">
+  <p:tag name="_INSTRUCTOR VIEW19C14C36-AC8E-43BC-9DB6-C2AAF774C7DC|PANE__TAG" val="_"/>
+</p:tagLst>
+</file>
+
 <file path=ppt/tags/tag13.xml><?xml version="1.0" encoding="utf-8"?>
+<p:tagLst xmlns:a="http://schemas.openxmlformats.org/drawingml/2006/main" xmlns:r="http://schemas.openxmlformats.org/officeDocument/2006/relationships" xmlns:p="http://schemas.openxmlformats.org/presentationml/2006/main">
+  <p:tag name="_INSTRUCTOR VIEW19C14C36-AC8E-43BC-9DB6-C2AAF774C7DC|PANE__TAG" val="_"/>
+</p:tagLst>
+</file>
+
+<file path=ppt/tags/tag130.xml><?xml version="1.0" encoding="utf-8"?>
+<p:tagLst xmlns:a="http://schemas.openxmlformats.org/drawingml/2006/main" xmlns:r="http://schemas.openxmlformats.org/officeDocument/2006/relationships" xmlns:p="http://schemas.openxmlformats.org/presentationml/2006/main">
+  <p:tag name="_INSTRUCTOR VIEW19C14C36-AC8E-43BC-9DB6-C2AAF774C7DC|PANE__TAG" val="_"/>
+</p:tagLst>
+</file>
+
+<file path=ppt/tags/tag131.xml><?xml version="1.0" encoding="utf-8"?>
+<p:tagLst xmlns:a="http://schemas.openxmlformats.org/drawingml/2006/main" xmlns:r="http://schemas.openxmlformats.org/officeDocument/2006/relationships" xmlns:p="http://schemas.openxmlformats.org/presentationml/2006/main">
+  <p:tag name="_INSTRUCTOR VIEW19C14C36-AC8E-43BC-9DB6-C2AAF774C7DC|PANE__TAG" val="_"/>
+</p:tagLst>
+</file>
+
+<file path=ppt/tags/tag132.xml><?xml version="1.0" encoding="utf-8"?>
+<p:tagLst xmlns:a="http://schemas.openxmlformats.org/drawingml/2006/main" xmlns:r="http://schemas.openxmlformats.org/officeDocument/2006/relationships" xmlns:p="http://schemas.openxmlformats.org/presentationml/2006/main">
+  <p:tag name="_INSTRUCTOR VIEW19C14C36-AC8E-43BC-9DB6-C2AAF774C7DC|PANE__TAG" val="_"/>
+</p:tagLst>
+</file>
+
+<file path=ppt/tags/tag133.xml><?xml version="1.0" encoding="utf-8"?>
+<p:tagLst xmlns:a="http://schemas.openxmlformats.org/drawingml/2006/main" xmlns:r="http://schemas.openxmlformats.org/officeDocument/2006/relationships" xmlns:p="http://schemas.openxmlformats.org/presentationml/2006/main">
+  <p:tag name="_INSTRUCTOR VIEW19C14C36-AC8E-43BC-9DB6-C2AAF774C7DC|PANE__TAG" val="_"/>
+</p:tagLst>
+</file>
+
+<file path=ppt/tags/tag134.xml><?xml version="1.0" encoding="utf-8"?>
 <p:tagLst xmlns:a="http://schemas.openxmlformats.org/drawingml/2006/main" xmlns:r="http://schemas.openxmlformats.org/officeDocument/2006/relationships" xmlns:p="http://schemas.openxmlformats.org/presentationml/2006/main">
   <p:tag name="_INSTRUCTOR VIEW19C14C36-AC8E-43BC-9DB6-C2AAF774C7DC|PANE__TAG" val="_"/>
 </p:tagLst>

</xml_diff>